<commit_message>
Poursuite du diaporama de revue finale.
</commit_message>
<xml_diff>
--- a/Nathan/Compte-rendus/REVUE-FINALE-GUIGAND-SFL6.pptx
+++ b/Nathan/Compte-rendus/REVUE-FINALE-GUIGAND-SFL6.pptx
@@ -23,6 +23,7 @@
     <p:sldId id="263" r:id="rId17"/>
     <p:sldId id="272" r:id="rId18"/>
     <p:sldId id="278" r:id="rId19"/>
+    <p:sldId id="280" r:id="rId20"/>
   </p:sldIdLst>
   <p:sldSz cx="12192000" cy="6858000"/>
   <p:notesSz cx="6858000" cy="9144000"/>
@@ -10186,45 +10187,6 @@
           </a:extLst>
         </p:spPr>
       </p:pic>
-      <p:pic>
-        <p:nvPicPr>
-          <p:cNvPr id="2" name="Image 1">
-            <a:extLst>
-              <a:ext uri="{FF2B5EF4-FFF2-40B4-BE49-F238E27FC236}">
-                <a16:creationId xmlns:a16="http://schemas.microsoft.com/office/drawing/2014/main" id="{66C1DE2A-C142-4ED2-9E13-DCFA37058D76}"/>
-              </a:ext>
-            </a:extLst>
-          </p:cNvPr>
-          <p:cNvPicPr>
-            <a:picLocks noChangeAspect="1"/>
-          </p:cNvPicPr>
-          <p:nvPr/>
-        </p:nvPicPr>
-        <p:blipFill rotWithShape="1">
-          <a:blip r:embed="rId3"/>
-          <a:srcRect l="434"/>
-          <a:stretch/>
-        </p:blipFill>
-        <p:spPr>
-          <a:xfrm>
-            <a:off x="847725" y="1241993"/>
-            <a:ext cx="7969340" cy="5297583"/>
-          </a:xfrm>
-          <a:prstGeom prst="rect">
-            <a:avLst/>
-          </a:prstGeom>
-          <a:ln>
-            <a:noFill/>
-          </a:ln>
-          <a:effectLst>
-            <a:outerShdw blurRad="292100" dist="139700" dir="2700000" algn="tl" rotWithShape="0">
-              <a:srgbClr val="333333">
-                <a:alpha val="65000"/>
-              </a:srgbClr>
-            </a:outerShdw>
-          </a:effectLst>
-        </p:spPr>
-      </p:pic>
       <p:sp>
         <p:nvSpPr>
           <p:cNvPr id="6" name="Organigramme : Terminateur 5">
@@ -12222,6 +12184,64 @@
                 </a:effectLst>
               </a:rPr>
               <a:t>10</a:t>
+            </a:r>
+          </a:p>
+        </p:txBody>
+      </p:sp>
+      <p:sp>
+        <p:nvSpPr>
+          <p:cNvPr id="45" name="Rectangle 44">
+            <a:extLst>
+              <a:ext uri="{FF2B5EF4-FFF2-40B4-BE49-F238E27FC236}">
+                <a16:creationId xmlns:a16="http://schemas.microsoft.com/office/drawing/2014/main" id="{4669087A-7C66-4788-9C5B-6C030FF76B59}"/>
+              </a:ext>
+            </a:extLst>
+          </p:cNvPr>
+          <p:cNvSpPr/>
+          <p:nvPr/>
+        </p:nvSpPr>
+        <p:spPr>
+          <a:xfrm>
+            <a:off x="9714921" y="0"/>
+            <a:ext cx="2477079" cy="6858000"/>
+          </a:xfrm>
+          <a:prstGeom prst="rect">
+            <a:avLst/>
+          </a:prstGeom>
+          <a:solidFill>
+            <a:schemeClr val="accent1">
+              <a:alpha val="68000"/>
+            </a:schemeClr>
+          </a:solidFill>
+        </p:spPr>
+        <p:style>
+          <a:lnRef idx="2">
+            <a:schemeClr val="accent1">
+              <a:shade val="50000"/>
+            </a:schemeClr>
+          </a:lnRef>
+          <a:fillRef idx="1">
+            <a:schemeClr val="accent1"/>
+          </a:fillRef>
+          <a:effectRef idx="0">
+            <a:schemeClr val="accent1"/>
+          </a:effectRef>
+          <a:fontRef idx="minor">
+            <a:schemeClr val="lt1"/>
+          </a:fontRef>
+        </p:style>
+        <p:txBody>
+          <a:bodyPr rtlCol="0" anchor="ctr"/>
+          <a:lstStyle/>
+          <a:p>
+            <a:pPr algn="ctr"/>
+            <a:r>
+              <a:rPr lang="fr-FR" sz="2000" b="1" u="sng" dirty="0">
+                <a:solidFill>
+                  <a:schemeClr val="tx1"/>
+                </a:solidFill>
+              </a:rPr>
+              <a:t>- Chemin de fer -</a:t>
             </a:r>
           </a:p>
         </p:txBody>
@@ -12396,85 +12416,6 @@
           </a:extLst>
         </p:spPr>
       </p:pic>
-      <p:pic>
-        <p:nvPicPr>
-          <p:cNvPr id="3" name="Image 2">
-            <a:extLst>
-              <a:ext uri="{FF2B5EF4-FFF2-40B4-BE49-F238E27FC236}">
-                <a16:creationId xmlns:a16="http://schemas.microsoft.com/office/drawing/2014/main" id="{B737A292-C500-4F9E-B374-C549D6966BDC}"/>
-              </a:ext>
-            </a:extLst>
-          </p:cNvPr>
-          <p:cNvPicPr>
-            <a:picLocks noChangeAspect="1"/>
-          </p:cNvPicPr>
-          <p:nvPr/>
-        </p:nvPicPr>
-        <p:blipFill rotWithShape="1">
-          <a:blip r:embed="rId3"/>
-          <a:srcRect l="1335" t="1124"/>
-          <a:stretch/>
-        </p:blipFill>
-        <p:spPr>
-          <a:xfrm>
-            <a:off x="1088230" y="1862138"/>
-            <a:ext cx="3783565" cy="3914194"/>
-          </a:xfrm>
-          <a:prstGeom prst="rect">
-            <a:avLst/>
-          </a:prstGeom>
-          <a:ln>
-            <a:noFill/>
-          </a:ln>
-          <a:effectLst>
-            <a:outerShdw blurRad="292100" dist="139700" dir="2700000" algn="tl" rotWithShape="0">
-              <a:srgbClr val="333333">
-                <a:alpha val="65000"/>
-              </a:srgbClr>
-            </a:outerShdw>
-          </a:effectLst>
-        </p:spPr>
-      </p:pic>
-      <p:pic>
-        <p:nvPicPr>
-          <p:cNvPr id="7" name="Image 6">
-            <a:extLst>
-              <a:ext uri="{FF2B5EF4-FFF2-40B4-BE49-F238E27FC236}">
-                <a16:creationId xmlns:a16="http://schemas.microsoft.com/office/drawing/2014/main" id="{63D11CDC-1242-4135-8684-B6ABFEBB6BC8}"/>
-              </a:ext>
-            </a:extLst>
-          </p:cNvPr>
-          <p:cNvPicPr>
-            <a:picLocks noChangeAspect="1"/>
-          </p:cNvPicPr>
-          <p:nvPr/>
-        </p:nvPicPr>
-        <p:blipFill>
-          <a:blip r:embed="rId4"/>
-          <a:stretch>
-            <a:fillRect/>
-          </a:stretch>
-        </p:blipFill>
-        <p:spPr>
-          <a:xfrm>
-            <a:off x="5260140" y="1279530"/>
-            <a:ext cx="3761197" cy="5475249"/>
-          </a:xfrm>
-          <a:prstGeom prst="rect">
-            <a:avLst/>
-          </a:prstGeom>
-          <a:ln>
-            <a:noFill/>
-          </a:ln>
-          <a:effectLst>
-            <a:outerShdw blurRad="292100" dist="139700" dir="2700000" algn="tl" rotWithShape="0">
-              <a:srgbClr val="333333">
-                <a:alpha val="65000"/>
-              </a:srgbClr>
-            </a:outerShdw>
-          </a:effectLst>
-        </p:spPr>
-      </p:pic>
       <p:sp>
         <p:nvSpPr>
           <p:cNvPr id="6" name="Organigramme : Terminateur 5">
@@ -14472,6 +14413,64 @@
                 </a:effectLst>
               </a:rPr>
               <a:t>11</a:t>
+            </a:r>
+          </a:p>
+        </p:txBody>
+      </p:sp>
+      <p:sp>
+        <p:nvSpPr>
+          <p:cNvPr id="46" name="Rectangle 45">
+            <a:extLst>
+              <a:ext uri="{FF2B5EF4-FFF2-40B4-BE49-F238E27FC236}">
+                <a16:creationId xmlns:a16="http://schemas.microsoft.com/office/drawing/2014/main" id="{CCF96A88-A8E4-4F5D-8D68-D7519E573D65}"/>
+              </a:ext>
+            </a:extLst>
+          </p:cNvPr>
+          <p:cNvSpPr/>
+          <p:nvPr/>
+        </p:nvSpPr>
+        <p:spPr>
+          <a:xfrm>
+            <a:off x="9714921" y="0"/>
+            <a:ext cx="2477079" cy="6858000"/>
+          </a:xfrm>
+          <a:prstGeom prst="rect">
+            <a:avLst/>
+          </a:prstGeom>
+          <a:solidFill>
+            <a:schemeClr val="accent1">
+              <a:alpha val="68000"/>
+            </a:schemeClr>
+          </a:solidFill>
+        </p:spPr>
+        <p:style>
+          <a:lnRef idx="2">
+            <a:schemeClr val="accent1">
+              <a:shade val="50000"/>
+            </a:schemeClr>
+          </a:lnRef>
+          <a:fillRef idx="1">
+            <a:schemeClr val="accent1"/>
+          </a:fillRef>
+          <a:effectRef idx="0">
+            <a:schemeClr val="accent1"/>
+          </a:effectRef>
+          <a:fontRef idx="minor">
+            <a:schemeClr val="lt1"/>
+          </a:fontRef>
+        </p:style>
+        <p:txBody>
+          <a:bodyPr rtlCol="0" anchor="ctr"/>
+          <a:lstStyle/>
+          <a:p>
+            <a:pPr algn="ctr"/>
+            <a:r>
+              <a:rPr lang="fr-FR" sz="2000" b="1" u="sng" dirty="0">
+                <a:solidFill>
+                  <a:schemeClr val="tx1"/>
+                </a:solidFill>
+              </a:rPr>
+              <a:t>- Chemin de fer -</a:t>
             </a:r>
           </a:p>
         </p:txBody>
@@ -16765,6 +16764,64 @@
           </a:prstGeom>
         </p:spPr>
       </p:pic>
+      <p:sp>
+        <p:nvSpPr>
+          <p:cNvPr id="45" name="Rectangle 44">
+            <a:extLst>
+              <a:ext uri="{FF2B5EF4-FFF2-40B4-BE49-F238E27FC236}">
+                <a16:creationId xmlns:a16="http://schemas.microsoft.com/office/drawing/2014/main" id="{E44403DD-DB7F-442F-A5A7-B245FBB4E498}"/>
+              </a:ext>
+            </a:extLst>
+          </p:cNvPr>
+          <p:cNvSpPr/>
+          <p:nvPr/>
+        </p:nvSpPr>
+        <p:spPr>
+          <a:xfrm>
+            <a:off x="9714921" y="0"/>
+            <a:ext cx="2477079" cy="6858000"/>
+          </a:xfrm>
+          <a:prstGeom prst="rect">
+            <a:avLst/>
+          </a:prstGeom>
+          <a:solidFill>
+            <a:schemeClr val="accent1">
+              <a:alpha val="68000"/>
+            </a:schemeClr>
+          </a:solidFill>
+        </p:spPr>
+        <p:style>
+          <a:lnRef idx="2">
+            <a:schemeClr val="accent1">
+              <a:shade val="50000"/>
+            </a:schemeClr>
+          </a:lnRef>
+          <a:fillRef idx="1">
+            <a:schemeClr val="accent1"/>
+          </a:fillRef>
+          <a:effectRef idx="0">
+            <a:schemeClr val="accent1"/>
+          </a:effectRef>
+          <a:fontRef idx="minor">
+            <a:schemeClr val="lt1"/>
+          </a:fontRef>
+        </p:style>
+        <p:txBody>
+          <a:bodyPr rtlCol="0" anchor="ctr"/>
+          <a:lstStyle/>
+          <a:p>
+            <a:pPr algn="ctr"/>
+            <a:r>
+              <a:rPr lang="fr-FR" sz="2000" b="1" u="sng" dirty="0">
+                <a:solidFill>
+                  <a:schemeClr val="tx1"/>
+                </a:solidFill>
+              </a:rPr>
+              <a:t>- Chemin de fer -</a:t>
+            </a:r>
+          </a:p>
+        </p:txBody>
+      </p:sp>
     </p:spTree>
     <p:extLst>
       <p:ext uri="{BB962C8B-B14F-4D97-AF65-F5344CB8AC3E}">
@@ -18926,6 +18983,64 @@
           </a:prstGeom>
         </p:spPr>
       </p:pic>
+      <p:sp>
+        <p:nvSpPr>
+          <p:cNvPr id="42" name="Rectangle 41">
+            <a:extLst>
+              <a:ext uri="{FF2B5EF4-FFF2-40B4-BE49-F238E27FC236}">
+                <a16:creationId xmlns:a16="http://schemas.microsoft.com/office/drawing/2014/main" id="{02E3E318-12F8-4DE1-9F6C-9C961A09E376}"/>
+              </a:ext>
+            </a:extLst>
+          </p:cNvPr>
+          <p:cNvSpPr/>
+          <p:nvPr/>
+        </p:nvSpPr>
+        <p:spPr>
+          <a:xfrm>
+            <a:off x="9714921" y="0"/>
+            <a:ext cx="2477079" cy="6858000"/>
+          </a:xfrm>
+          <a:prstGeom prst="rect">
+            <a:avLst/>
+          </a:prstGeom>
+          <a:solidFill>
+            <a:schemeClr val="accent1">
+              <a:alpha val="68000"/>
+            </a:schemeClr>
+          </a:solidFill>
+        </p:spPr>
+        <p:style>
+          <a:lnRef idx="2">
+            <a:schemeClr val="accent1">
+              <a:shade val="50000"/>
+            </a:schemeClr>
+          </a:lnRef>
+          <a:fillRef idx="1">
+            <a:schemeClr val="accent1"/>
+          </a:fillRef>
+          <a:effectRef idx="0">
+            <a:schemeClr val="accent1"/>
+          </a:effectRef>
+          <a:fontRef idx="minor">
+            <a:schemeClr val="lt1"/>
+          </a:fontRef>
+        </p:style>
+        <p:txBody>
+          <a:bodyPr rtlCol="0" anchor="ctr"/>
+          <a:lstStyle/>
+          <a:p>
+            <a:pPr algn="ctr"/>
+            <a:r>
+              <a:rPr lang="fr-FR" sz="2000" b="1" u="sng" dirty="0">
+                <a:solidFill>
+                  <a:schemeClr val="tx1"/>
+                </a:solidFill>
+              </a:rPr>
+              <a:t>- Chemin de fer -</a:t>
+            </a:r>
+          </a:p>
+        </p:txBody>
+      </p:sp>
     </p:spTree>
     <p:extLst>
       <p:ext uri="{BB962C8B-B14F-4D97-AF65-F5344CB8AC3E}">
@@ -19064,7 +19179,7 @@
           <a:p>
             <a:pPr algn="ctr"/>
             <a:r>
-              <a:rPr lang="fr-FR" sz="2400" b="1">
+              <a:rPr lang="fr-FR" sz="2400" b="1" dirty="0">
                 <a:latin typeface="Eras Medium ITC" panose="020B0602030504020804" pitchFamily="34" charset="0"/>
               </a:rPr>
               <a:t>Diagramme de classes :</a:t>
@@ -21197,6 +21312,64 @@
           </a:prstGeom>
         </p:spPr>
       </p:pic>
+      <p:sp>
+        <p:nvSpPr>
+          <p:cNvPr id="46" name="Rectangle 45">
+            <a:extLst>
+              <a:ext uri="{FF2B5EF4-FFF2-40B4-BE49-F238E27FC236}">
+                <a16:creationId xmlns:a16="http://schemas.microsoft.com/office/drawing/2014/main" id="{568A9CB4-76C5-48A2-8E6E-F6BF80B7EFD4}"/>
+              </a:ext>
+            </a:extLst>
+          </p:cNvPr>
+          <p:cNvSpPr/>
+          <p:nvPr/>
+        </p:nvSpPr>
+        <p:spPr>
+          <a:xfrm>
+            <a:off x="9714921" y="0"/>
+            <a:ext cx="2477079" cy="6858000"/>
+          </a:xfrm>
+          <a:prstGeom prst="rect">
+            <a:avLst/>
+          </a:prstGeom>
+          <a:solidFill>
+            <a:schemeClr val="accent1">
+              <a:alpha val="68000"/>
+            </a:schemeClr>
+          </a:solidFill>
+        </p:spPr>
+        <p:style>
+          <a:lnRef idx="2">
+            <a:schemeClr val="accent1">
+              <a:shade val="50000"/>
+            </a:schemeClr>
+          </a:lnRef>
+          <a:fillRef idx="1">
+            <a:schemeClr val="accent1"/>
+          </a:fillRef>
+          <a:effectRef idx="0">
+            <a:schemeClr val="accent1"/>
+          </a:effectRef>
+          <a:fontRef idx="minor">
+            <a:schemeClr val="lt1"/>
+          </a:fontRef>
+        </p:style>
+        <p:txBody>
+          <a:bodyPr rtlCol="0" anchor="ctr"/>
+          <a:lstStyle/>
+          <a:p>
+            <a:pPr algn="ctr"/>
+            <a:r>
+              <a:rPr lang="fr-FR" sz="2000" b="1" u="sng" dirty="0">
+                <a:solidFill>
+                  <a:schemeClr val="tx1"/>
+                </a:solidFill>
+              </a:rPr>
+              <a:t>- Chemin de fer -</a:t>
+            </a:r>
+          </a:p>
+        </p:txBody>
+      </p:sp>
     </p:spTree>
     <p:extLst>
       <p:ext uri="{BB962C8B-B14F-4D97-AF65-F5344CB8AC3E}">
@@ -21239,6 +21412,192 @@
           <a:chExt cx="0" cy="0"/>
         </a:xfrm>
       </p:grpSpPr>
+      <p:sp>
+        <p:nvSpPr>
+          <p:cNvPr id="2" name="Rectangle 1">
+            <a:extLst>
+              <a:ext uri="{FF2B5EF4-FFF2-40B4-BE49-F238E27FC236}">
+                <a16:creationId xmlns:a16="http://schemas.microsoft.com/office/drawing/2014/main" id="{F266962D-B289-4913-9AC0-A37A39F937A6}"/>
+              </a:ext>
+            </a:extLst>
+          </p:cNvPr>
+          <p:cNvSpPr/>
+          <p:nvPr/>
+        </p:nvSpPr>
+        <p:spPr>
+          <a:xfrm>
+            <a:off x="9714921" y="0"/>
+            <a:ext cx="2477079" cy="6858000"/>
+          </a:xfrm>
+          <a:prstGeom prst="rect">
+            <a:avLst/>
+          </a:prstGeom>
+          <a:solidFill>
+            <a:schemeClr val="accent1">
+              <a:alpha val="68000"/>
+            </a:schemeClr>
+          </a:solidFill>
+        </p:spPr>
+        <p:style>
+          <a:lnRef idx="2">
+            <a:schemeClr val="accent1">
+              <a:shade val="50000"/>
+            </a:schemeClr>
+          </a:lnRef>
+          <a:fillRef idx="1">
+            <a:schemeClr val="accent1"/>
+          </a:fillRef>
+          <a:effectRef idx="0">
+            <a:schemeClr val="accent1"/>
+          </a:effectRef>
+          <a:fontRef idx="minor">
+            <a:schemeClr val="lt1"/>
+          </a:fontRef>
+        </p:style>
+        <p:txBody>
+          <a:bodyPr rtlCol="0" anchor="ctr"/>
+          <a:lstStyle/>
+          <a:p>
+            <a:pPr algn="ctr"/>
+            <a:r>
+              <a:rPr lang="fr-FR" sz="2000" b="1" u="sng" dirty="0">
+                <a:solidFill>
+                  <a:schemeClr val="tx1"/>
+                </a:solidFill>
+              </a:rPr>
+              <a:t>- Chemin de fer -</a:t>
+            </a:r>
+          </a:p>
+        </p:txBody>
+      </p:sp>
+      <p:sp>
+        <p:nvSpPr>
+          <p:cNvPr id="3" name="ZoneTexte 2">
+            <a:extLst>
+              <a:ext uri="{FF2B5EF4-FFF2-40B4-BE49-F238E27FC236}">
+                <a16:creationId xmlns:a16="http://schemas.microsoft.com/office/drawing/2014/main" id="{38F7C7D2-1B30-482E-9E67-C1402E31F3BD}"/>
+              </a:ext>
+            </a:extLst>
+          </p:cNvPr>
+          <p:cNvSpPr txBox="1"/>
+          <p:nvPr/>
+        </p:nvSpPr>
+        <p:spPr>
+          <a:xfrm>
+            <a:off x="2477079" y="168260"/>
+            <a:ext cx="6848856" cy="584775"/>
+          </a:xfrm>
+          <a:prstGeom prst="rect">
+            <a:avLst/>
+          </a:prstGeom>
+          <a:noFill/>
+          <a:ln>
+            <a:noFill/>
+          </a:ln>
+          <a:effectLst>
+            <a:glow rad="63500">
+              <a:schemeClr val="accent4">
+                <a:satMod val="175000"/>
+                <a:alpha val="40000"/>
+              </a:schemeClr>
+            </a:glow>
+            <a:outerShdw blurRad="50800" dist="38100" dir="5400000" algn="t" rotWithShape="0">
+              <a:prstClr val="black">
+                <a:alpha val="40000"/>
+              </a:prstClr>
+            </a:outerShdw>
+          </a:effectLst>
+          <a:scene3d>
+            <a:camera prst="orthographicFront">
+              <a:rot lat="0" lon="0" rev="0"/>
+            </a:camera>
+            <a:lightRig rig="soft" dir="t">
+              <a:rot lat="0" lon="0" rev="0"/>
+            </a:lightRig>
+          </a:scene3d>
+          <a:sp3d contourW="44450" prstMaterial="matte">
+            <a:bevelT w="63500" h="63500" prst="artDeco"/>
+            <a:contourClr>
+              <a:srgbClr val="FFFFFF"/>
+            </a:contourClr>
+          </a:sp3d>
+        </p:spPr>
+        <p:txBody>
+          <a:bodyPr wrap="square" rtlCol="0">
+            <a:spAutoFit/>
+          </a:bodyPr>
+          <a:lstStyle/>
+          <a:p>
+            <a:pPr algn="ctr"/>
+            <a:r>
+              <a:rPr lang="fr-FR" sz="3200" b="1" dirty="0">
+                <a:latin typeface="Eras Medium ITC" panose="020B0602030504020804" pitchFamily="34" charset="0"/>
+              </a:rPr>
+              <a:t>Physique Appliquée – </a:t>
+            </a:r>
+            <a:r>
+              <a:rPr lang="fr-FR" sz="2800" b="1" dirty="0">
+                <a:solidFill>
+                  <a:srgbClr val="A41258"/>
+                </a:solidFill>
+                <a:latin typeface="Eras Medium ITC" panose="020B0602030504020804" pitchFamily="34" charset="0"/>
+              </a:rPr>
+              <a:t>Étude théorique</a:t>
+            </a:r>
+            <a:r>
+              <a:rPr lang="fr-FR" sz="2800" b="1" dirty="0">
+                <a:latin typeface="Eras Medium ITC" panose="020B0602030504020804" pitchFamily="34" charset="0"/>
+              </a:rPr>
+              <a:t>:</a:t>
+            </a:r>
+          </a:p>
+        </p:txBody>
+      </p:sp>
+      <p:pic>
+        <p:nvPicPr>
+          <p:cNvPr id="4" name="Picture 2" descr="Image associée">
+            <a:extLst>
+              <a:ext uri="{FF2B5EF4-FFF2-40B4-BE49-F238E27FC236}">
+                <a16:creationId xmlns:a16="http://schemas.microsoft.com/office/drawing/2014/main" id="{21A5E8FA-1649-4D11-909C-9C830D199873}"/>
+              </a:ext>
+            </a:extLst>
+          </p:cNvPr>
+          <p:cNvPicPr>
+            <a:picLocks noChangeAspect="1" noChangeArrowheads="1"/>
+          </p:cNvPicPr>
+          <p:nvPr/>
+        </p:nvPicPr>
+        <p:blipFill rotWithShape="1">
+          <a:blip r:embed="rId2">
+            <a:extLst>
+              <a:ext uri="{28A0092B-C50C-407E-A947-70E740481C1C}">
+                <a14:useLocalDpi xmlns:a14="http://schemas.microsoft.com/office/drawing/2010/main" val="0"/>
+              </a:ext>
+            </a:extLst>
+          </a:blip>
+          <a:srcRect l="18677" r="15441"/>
+          <a:stretch/>
+        </p:blipFill>
+        <p:spPr bwMode="auto">
+          <a:xfrm>
+            <a:off x="143436" y="143435"/>
+            <a:ext cx="2269635" cy="609600"/>
+          </a:xfrm>
+          <a:prstGeom prst="rect">
+            <a:avLst/>
+          </a:prstGeom>
+          <a:noFill/>
+          <a:extLst>
+            <a:ext uri="{909E8E84-426E-40DD-AFC4-6F175D3DCCD1}">
+              <a14:hiddenFill xmlns:a14="http://schemas.microsoft.com/office/drawing/2010/main">
+                <a:solidFill>
+                  <a:srgbClr val="FFFFFF"/>
+                </a:solidFill>
+              </a14:hiddenFill>
+            </a:ext>
+          </a:extLst>
+        </p:spPr>
+      </p:pic>
     </p:spTree>
     <p:extLst>
       <p:ext uri="{BB962C8B-B14F-4D97-AF65-F5344CB8AC3E}">
@@ -23562,6 +23921,64 @@
                 </a:effectLst>
               </a:rPr>
               <a:t>18</a:t>
+            </a:r>
+          </a:p>
+        </p:txBody>
+      </p:sp>
+      <p:sp>
+        <p:nvSpPr>
+          <p:cNvPr id="47" name="Rectangle 46">
+            <a:extLst>
+              <a:ext uri="{FF2B5EF4-FFF2-40B4-BE49-F238E27FC236}">
+                <a16:creationId xmlns:a16="http://schemas.microsoft.com/office/drawing/2014/main" id="{6251FCB0-60FC-419F-BF65-DA04A8DBB911}"/>
+              </a:ext>
+            </a:extLst>
+          </p:cNvPr>
+          <p:cNvSpPr/>
+          <p:nvPr/>
+        </p:nvSpPr>
+        <p:spPr>
+          <a:xfrm>
+            <a:off x="9714921" y="0"/>
+            <a:ext cx="2477079" cy="6858000"/>
+          </a:xfrm>
+          <a:prstGeom prst="rect">
+            <a:avLst/>
+          </a:prstGeom>
+          <a:solidFill>
+            <a:schemeClr val="accent1">
+              <a:alpha val="68000"/>
+            </a:schemeClr>
+          </a:solidFill>
+        </p:spPr>
+        <p:style>
+          <a:lnRef idx="2">
+            <a:schemeClr val="accent1">
+              <a:shade val="50000"/>
+            </a:schemeClr>
+          </a:lnRef>
+          <a:fillRef idx="1">
+            <a:schemeClr val="accent1"/>
+          </a:fillRef>
+          <a:effectRef idx="0">
+            <a:schemeClr val="accent1"/>
+          </a:effectRef>
+          <a:fontRef idx="minor">
+            <a:schemeClr val="lt1"/>
+          </a:fontRef>
+        </p:style>
+        <p:txBody>
+          <a:bodyPr rtlCol="0" anchor="ctr"/>
+          <a:lstStyle/>
+          <a:p>
+            <a:pPr algn="ctr"/>
+            <a:r>
+              <a:rPr lang="fr-FR" sz="2000" b="1" u="sng" dirty="0">
+                <a:solidFill>
+                  <a:schemeClr val="tx1"/>
+                </a:solidFill>
+              </a:rPr>
+              <a:t>- Chemin de fer -</a:t>
             </a:r>
           </a:p>
         </p:txBody>
@@ -25893,6 +26310,64 @@
           </a:effectLst>
         </p:spPr>
       </p:pic>
+      <p:sp>
+        <p:nvSpPr>
+          <p:cNvPr id="47" name="Rectangle 46">
+            <a:extLst>
+              <a:ext uri="{FF2B5EF4-FFF2-40B4-BE49-F238E27FC236}">
+                <a16:creationId xmlns:a16="http://schemas.microsoft.com/office/drawing/2014/main" id="{A23C9094-42A4-4EAE-A7D0-BEE87EE7BBEE}"/>
+              </a:ext>
+            </a:extLst>
+          </p:cNvPr>
+          <p:cNvSpPr/>
+          <p:nvPr/>
+        </p:nvSpPr>
+        <p:spPr>
+          <a:xfrm>
+            <a:off x="9714921" y="0"/>
+            <a:ext cx="2477079" cy="6858000"/>
+          </a:xfrm>
+          <a:prstGeom prst="rect">
+            <a:avLst/>
+          </a:prstGeom>
+          <a:solidFill>
+            <a:schemeClr val="accent1">
+              <a:alpha val="68000"/>
+            </a:schemeClr>
+          </a:solidFill>
+        </p:spPr>
+        <p:style>
+          <a:lnRef idx="2">
+            <a:schemeClr val="accent1">
+              <a:shade val="50000"/>
+            </a:schemeClr>
+          </a:lnRef>
+          <a:fillRef idx="1">
+            <a:schemeClr val="accent1"/>
+          </a:fillRef>
+          <a:effectRef idx="0">
+            <a:schemeClr val="accent1"/>
+          </a:effectRef>
+          <a:fontRef idx="minor">
+            <a:schemeClr val="lt1"/>
+          </a:fontRef>
+        </p:style>
+        <p:txBody>
+          <a:bodyPr rtlCol="0" anchor="ctr"/>
+          <a:lstStyle/>
+          <a:p>
+            <a:pPr algn="ctr"/>
+            <a:r>
+              <a:rPr lang="fr-FR" sz="2000" b="1" u="sng" dirty="0">
+                <a:solidFill>
+                  <a:schemeClr val="tx1"/>
+                </a:solidFill>
+              </a:rPr>
+              <a:t>- Chemin de fer -</a:t>
+            </a:r>
+          </a:p>
+        </p:txBody>
+      </p:sp>
     </p:spTree>
     <p:extLst>
       <p:ext uri="{BB962C8B-B14F-4D97-AF65-F5344CB8AC3E}">
@@ -28230,6 +28705,64 @@
           </a:effectLst>
         </p:spPr>
       </p:pic>
+      <p:sp>
+        <p:nvSpPr>
+          <p:cNvPr id="2" name="Rectangle 1">
+            <a:extLst>
+              <a:ext uri="{FF2B5EF4-FFF2-40B4-BE49-F238E27FC236}">
+                <a16:creationId xmlns:a16="http://schemas.microsoft.com/office/drawing/2014/main" id="{970385B9-80DB-4505-B9EB-DA2DF305A8BF}"/>
+              </a:ext>
+            </a:extLst>
+          </p:cNvPr>
+          <p:cNvSpPr/>
+          <p:nvPr/>
+        </p:nvSpPr>
+        <p:spPr>
+          <a:xfrm>
+            <a:off x="9714921" y="0"/>
+            <a:ext cx="2477079" cy="6858000"/>
+          </a:xfrm>
+          <a:prstGeom prst="rect">
+            <a:avLst/>
+          </a:prstGeom>
+          <a:solidFill>
+            <a:schemeClr val="accent1">
+              <a:alpha val="68000"/>
+            </a:schemeClr>
+          </a:solidFill>
+        </p:spPr>
+        <p:style>
+          <a:lnRef idx="2">
+            <a:schemeClr val="accent1">
+              <a:shade val="50000"/>
+            </a:schemeClr>
+          </a:lnRef>
+          <a:fillRef idx="1">
+            <a:schemeClr val="accent1"/>
+          </a:fillRef>
+          <a:effectRef idx="0">
+            <a:schemeClr val="accent1"/>
+          </a:effectRef>
+          <a:fontRef idx="minor">
+            <a:schemeClr val="lt1"/>
+          </a:fontRef>
+        </p:style>
+        <p:txBody>
+          <a:bodyPr rtlCol="0" anchor="ctr"/>
+          <a:lstStyle/>
+          <a:p>
+            <a:pPr algn="ctr"/>
+            <a:r>
+              <a:rPr lang="fr-FR" sz="2000" b="1" u="sng" dirty="0">
+                <a:solidFill>
+                  <a:schemeClr val="tx1"/>
+                </a:solidFill>
+              </a:rPr>
+              <a:t>- Chemin de fer -</a:t>
+            </a:r>
+          </a:p>
+        </p:txBody>
+      </p:sp>
     </p:spTree>
     <p:extLst>
       <p:ext uri="{BB962C8B-B14F-4D97-AF65-F5344CB8AC3E}">
@@ -28255,7 +28788,7 @@
 </p:sld>
 </file>
 
-<file path=ppt/slides/slide2.xml><?xml version="1.0" encoding="utf-8"?>
+<file path=ppt/slides/slide19.xml><?xml version="1.0" encoding="utf-8"?>
 <p:sld xmlns:a="http://schemas.openxmlformats.org/drawingml/2006/main" xmlns:r="http://schemas.openxmlformats.org/officeDocument/2006/relationships" xmlns:p="http://schemas.openxmlformats.org/presentationml/2006/main">
   <p:cSld>
     <p:spTree>
@@ -28272,12 +28805,70 @@
           <a:chExt cx="0" cy="0"/>
         </a:xfrm>
       </p:grpSpPr>
+      <p:sp>
+        <p:nvSpPr>
+          <p:cNvPr id="6" name="Rectangle 5">
+            <a:extLst>
+              <a:ext uri="{FF2B5EF4-FFF2-40B4-BE49-F238E27FC236}">
+                <a16:creationId xmlns:a16="http://schemas.microsoft.com/office/drawing/2014/main" id="{E3AE02B3-C4DC-436A-A431-5B88E1B1C457}"/>
+              </a:ext>
+            </a:extLst>
+          </p:cNvPr>
+          <p:cNvSpPr/>
+          <p:nvPr/>
+        </p:nvSpPr>
+        <p:spPr>
+          <a:xfrm>
+            <a:off x="9714921" y="0"/>
+            <a:ext cx="2477079" cy="6858000"/>
+          </a:xfrm>
+          <a:prstGeom prst="rect">
+            <a:avLst/>
+          </a:prstGeom>
+          <a:solidFill>
+            <a:schemeClr val="accent1">
+              <a:alpha val="68000"/>
+            </a:schemeClr>
+          </a:solidFill>
+        </p:spPr>
+        <p:style>
+          <a:lnRef idx="2">
+            <a:schemeClr val="accent1">
+              <a:shade val="50000"/>
+            </a:schemeClr>
+          </a:lnRef>
+          <a:fillRef idx="1">
+            <a:schemeClr val="accent1"/>
+          </a:fillRef>
+          <a:effectRef idx="0">
+            <a:schemeClr val="accent1"/>
+          </a:effectRef>
+          <a:fontRef idx="minor">
+            <a:schemeClr val="lt1"/>
+          </a:fontRef>
+        </p:style>
+        <p:txBody>
+          <a:bodyPr rtlCol="0" anchor="ctr"/>
+          <a:lstStyle/>
+          <a:p>
+            <a:pPr algn="ctr"/>
+            <a:r>
+              <a:rPr lang="fr-FR" sz="2000" b="1" u="sng" dirty="0">
+                <a:solidFill>
+                  <a:schemeClr val="tx1"/>
+                </a:solidFill>
+              </a:rPr>
+              <a:t>- Chemin de fer -</a:t>
+            </a:r>
+          </a:p>
+        </p:txBody>
+      </p:sp>
       <p:pic>
         <p:nvPicPr>
-          <p:cNvPr id="1026" name="Picture 2" descr="Image associée">
-            <a:extLst>
-              <a:ext uri="{FF2B5EF4-FFF2-40B4-BE49-F238E27FC236}">
-                <a16:creationId xmlns:a16="http://schemas.microsoft.com/office/drawing/2014/main" id="{C816F3D8-CC4C-46B3-A21E-58AE9AD30454}"/>
+          <p:cNvPr id="7" name="Picture 2" descr="Image associée">
+            <a:extLst>
+              <a:ext uri="{FF2B5EF4-FFF2-40B4-BE49-F238E27FC236}">
+                <a16:creationId xmlns:a16="http://schemas.microsoft.com/office/drawing/2014/main" id="{9758949A-29D7-49F3-998D-1FE21CF6F53E}"/>
               </a:ext>
             </a:extLst>
           </p:cNvPr>
@@ -28319,10 +28910,10 @@
       </p:pic>
       <p:sp>
         <p:nvSpPr>
-          <p:cNvPr id="3" name="ZoneTexte 2">
-            <a:extLst>
-              <a:ext uri="{FF2B5EF4-FFF2-40B4-BE49-F238E27FC236}">
-                <a16:creationId xmlns:a16="http://schemas.microsoft.com/office/drawing/2014/main" id="{A865E19C-F420-4342-965A-397CFA370BDA}"/>
+          <p:cNvPr id="8" name="ZoneTexte 7">
+            <a:extLst>
+              <a:ext uri="{FF2B5EF4-FFF2-40B4-BE49-F238E27FC236}">
+                <a16:creationId xmlns:a16="http://schemas.microsoft.com/office/drawing/2014/main" id="{A5F606AF-61D4-4A1F-A7D6-021438E8F927}"/>
               </a:ext>
             </a:extLst>
           </p:cNvPr>
@@ -28331,8 +28922,8 @@
         </p:nvSpPr>
         <p:spPr>
           <a:xfrm>
-            <a:off x="2816352" y="143435"/>
-            <a:ext cx="5342576" cy="646331"/>
+            <a:off x="2477079" y="168260"/>
+            <a:ext cx="6848856" cy="584775"/>
           </a:xfrm>
           <a:prstGeom prst="rect">
             <a:avLst/>
@@ -28377,6 +28968,164 @@
           <a:p>
             <a:pPr algn="ctr"/>
             <a:r>
+              <a:rPr lang="fr-FR" sz="3200" b="1" dirty="0">
+                <a:latin typeface="Eras Medium ITC" panose="020B0602030504020804" pitchFamily="34" charset="0"/>
+              </a:rPr>
+              <a:t>Suivi régulier – </a:t>
+            </a:r>
+            <a:r>
+              <a:rPr lang="fr-FR" sz="2800" b="1" dirty="0">
+                <a:solidFill>
+                  <a:srgbClr val="A41258"/>
+                </a:solidFill>
+                <a:latin typeface="Eras Medium ITC" panose="020B0602030504020804" pitchFamily="34" charset="0"/>
+              </a:rPr>
+              <a:t>Journal d’activités</a:t>
+            </a:r>
+            <a:r>
+              <a:rPr lang="fr-FR" sz="2800" b="1" dirty="0">
+                <a:latin typeface="Eras Medium ITC" panose="020B0602030504020804" pitchFamily="34" charset="0"/>
+              </a:rPr>
+              <a:t>:</a:t>
+            </a:r>
+          </a:p>
+        </p:txBody>
+      </p:sp>
+    </p:spTree>
+    <p:extLst>
+      <p:ext uri="{BB962C8B-B14F-4D97-AF65-F5344CB8AC3E}">
+        <p14:creationId xmlns:p14="http://schemas.microsoft.com/office/powerpoint/2010/main" val="1505658281"/>
+      </p:ext>
+    </p:extLst>
+  </p:cSld>
+  <p:clrMapOvr>
+    <a:masterClrMapping/>
+  </p:clrMapOvr>
+</p:sld>
+</file>
+
+<file path=ppt/slides/slide2.xml><?xml version="1.0" encoding="utf-8"?>
+<p:sld xmlns:a="http://schemas.openxmlformats.org/drawingml/2006/main" xmlns:r="http://schemas.openxmlformats.org/officeDocument/2006/relationships" xmlns:p="http://schemas.openxmlformats.org/presentationml/2006/main">
+  <p:cSld>
+    <p:spTree>
+      <p:nvGrpSpPr>
+        <p:cNvPr id="1" name=""/>
+        <p:cNvGrpSpPr/>
+        <p:nvPr/>
+      </p:nvGrpSpPr>
+      <p:grpSpPr>
+        <a:xfrm>
+          <a:off x="0" y="0"/>
+          <a:ext cx="0" cy="0"/>
+          <a:chOff x="0" y="0"/>
+          <a:chExt cx="0" cy="0"/>
+        </a:xfrm>
+      </p:grpSpPr>
+      <p:pic>
+        <p:nvPicPr>
+          <p:cNvPr id="1026" name="Picture 2" descr="Image associée">
+            <a:extLst>
+              <a:ext uri="{FF2B5EF4-FFF2-40B4-BE49-F238E27FC236}">
+                <a16:creationId xmlns:a16="http://schemas.microsoft.com/office/drawing/2014/main" id="{C816F3D8-CC4C-46B3-A21E-58AE9AD30454}"/>
+              </a:ext>
+            </a:extLst>
+          </p:cNvPr>
+          <p:cNvPicPr>
+            <a:picLocks noChangeAspect="1" noChangeArrowheads="1"/>
+          </p:cNvPicPr>
+          <p:nvPr/>
+        </p:nvPicPr>
+        <p:blipFill rotWithShape="1">
+          <a:blip r:embed="rId2">
+            <a:extLst>
+              <a:ext uri="{28A0092B-C50C-407E-A947-70E740481C1C}">
+                <a14:useLocalDpi xmlns:a14="http://schemas.microsoft.com/office/drawing/2010/main" val="0"/>
+              </a:ext>
+            </a:extLst>
+          </a:blip>
+          <a:srcRect l="18677" r="15441"/>
+          <a:stretch/>
+        </p:blipFill>
+        <p:spPr bwMode="auto">
+          <a:xfrm>
+            <a:off x="143436" y="143435"/>
+            <a:ext cx="2269635" cy="609600"/>
+          </a:xfrm>
+          <a:prstGeom prst="rect">
+            <a:avLst/>
+          </a:prstGeom>
+          <a:noFill/>
+          <a:extLst>
+            <a:ext uri="{909E8E84-426E-40DD-AFC4-6F175D3DCCD1}">
+              <a14:hiddenFill xmlns:a14="http://schemas.microsoft.com/office/drawing/2010/main">
+                <a:solidFill>
+                  <a:srgbClr val="FFFFFF"/>
+                </a:solidFill>
+              </a14:hiddenFill>
+            </a:ext>
+          </a:extLst>
+        </p:spPr>
+      </p:pic>
+      <p:sp>
+        <p:nvSpPr>
+          <p:cNvPr id="3" name="ZoneTexte 2">
+            <a:extLst>
+              <a:ext uri="{FF2B5EF4-FFF2-40B4-BE49-F238E27FC236}">
+                <a16:creationId xmlns:a16="http://schemas.microsoft.com/office/drawing/2014/main" id="{A865E19C-F420-4342-965A-397CFA370BDA}"/>
+              </a:ext>
+            </a:extLst>
+          </p:cNvPr>
+          <p:cNvSpPr txBox="1"/>
+          <p:nvPr/>
+        </p:nvSpPr>
+        <p:spPr>
+          <a:xfrm>
+            <a:off x="2816352" y="143435"/>
+            <a:ext cx="5342576" cy="646331"/>
+          </a:xfrm>
+          <a:prstGeom prst="rect">
+            <a:avLst/>
+          </a:prstGeom>
+          <a:noFill/>
+          <a:ln>
+            <a:noFill/>
+          </a:ln>
+          <a:effectLst>
+            <a:glow rad="63500">
+              <a:schemeClr val="accent4">
+                <a:satMod val="175000"/>
+                <a:alpha val="40000"/>
+              </a:schemeClr>
+            </a:glow>
+            <a:outerShdw blurRad="50800" dist="38100" dir="5400000" algn="t" rotWithShape="0">
+              <a:prstClr val="black">
+                <a:alpha val="40000"/>
+              </a:prstClr>
+            </a:outerShdw>
+          </a:effectLst>
+          <a:scene3d>
+            <a:camera prst="orthographicFront">
+              <a:rot lat="0" lon="0" rev="0"/>
+            </a:camera>
+            <a:lightRig rig="soft" dir="t">
+              <a:rot lat="0" lon="0" rev="0"/>
+            </a:lightRig>
+          </a:scene3d>
+          <a:sp3d contourW="44450" prstMaterial="matte">
+            <a:bevelT w="63500" h="63500" prst="artDeco"/>
+            <a:contourClr>
+              <a:srgbClr val="FFFFFF"/>
+            </a:contourClr>
+          </a:sp3d>
+        </p:spPr>
+        <p:txBody>
+          <a:bodyPr wrap="square" rtlCol="0">
+            <a:spAutoFit/>
+          </a:bodyPr>
+          <a:lstStyle/>
+          <a:p>
+            <a:pPr algn="ctr"/>
+            <a:r>
               <a:rPr lang="fr-FR" sz="3600" b="1" dirty="0">
                 <a:latin typeface="Eras Medium ITC" panose="020B0602030504020804" pitchFamily="34" charset="0"/>
               </a:rPr>
@@ -30265,6 +31014,64 @@
                 </a:effectLst>
               </a:rPr>
               <a:t>2</a:t>
+            </a:r>
+          </a:p>
+        </p:txBody>
+      </p:sp>
+      <p:sp>
+        <p:nvSpPr>
+          <p:cNvPr id="44" name="Rectangle 43">
+            <a:extLst>
+              <a:ext uri="{FF2B5EF4-FFF2-40B4-BE49-F238E27FC236}">
+                <a16:creationId xmlns:a16="http://schemas.microsoft.com/office/drawing/2014/main" id="{8DC5C7BA-1C4D-4B6C-A34B-D033119974AE}"/>
+              </a:ext>
+            </a:extLst>
+          </p:cNvPr>
+          <p:cNvSpPr/>
+          <p:nvPr/>
+        </p:nvSpPr>
+        <p:spPr>
+          <a:xfrm>
+            <a:off x="64395" y="958753"/>
+            <a:ext cx="10425805" cy="3860119"/>
+          </a:xfrm>
+          <a:prstGeom prst="rect">
+            <a:avLst/>
+          </a:prstGeom>
+          <a:solidFill>
+            <a:schemeClr val="accent1">
+              <a:alpha val="68000"/>
+            </a:schemeClr>
+          </a:solidFill>
+        </p:spPr>
+        <p:style>
+          <a:lnRef idx="2">
+            <a:schemeClr val="accent1">
+              <a:shade val="50000"/>
+            </a:schemeClr>
+          </a:lnRef>
+          <a:fillRef idx="1">
+            <a:schemeClr val="accent1"/>
+          </a:fillRef>
+          <a:effectRef idx="0">
+            <a:schemeClr val="accent1"/>
+          </a:effectRef>
+          <a:fontRef idx="minor">
+            <a:schemeClr val="lt1"/>
+          </a:fontRef>
+        </p:style>
+        <p:txBody>
+          <a:bodyPr rtlCol="0" anchor="ctr"/>
+          <a:lstStyle/>
+          <a:p>
+            <a:pPr algn="ctr"/>
+            <a:r>
+              <a:rPr lang="fr-FR" sz="2000" b="1" u="sng" dirty="0">
+                <a:solidFill>
+                  <a:schemeClr val="tx1"/>
+                </a:solidFill>
+              </a:rPr>
+              <a:t>- Chemin de fer -</a:t>
             </a:r>
           </a:p>
         </p:txBody>
@@ -32476,6 +33283,64 @@
                 </a:effectLst>
               </a:rPr>
               <a:t>3</a:t>
+            </a:r>
+          </a:p>
+        </p:txBody>
+      </p:sp>
+      <p:sp>
+        <p:nvSpPr>
+          <p:cNvPr id="55" name="Rectangle 54">
+            <a:extLst>
+              <a:ext uri="{FF2B5EF4-FFF2-40B4-BE49-F238E27FC236}">
+                <a16:creationId xmlns:a16="http://schemas.microsoft.com/office/drawing/2014/main" id="{D5524DD5-A098-49C3-BEE8-3DF03FA2A6D1}"/>
+              </a:ext>
+            </a:extLst>
+          </p:cNvPr>
+          <p:cNvSpPr/>
+          <p:nvPr/>
+        </p:nvSpPr>
+        <p:spPr>
+          <a:xfrm>
+            <a:off x="9714921" y="0"/>
+            <a:ext cx="2477079" cy="6858000"/>
+          </a:xfrm>
+          <a:prstGeom prst="rect">
+            <a:avLst/>
+          </a:prstGeom>
+          <a:solidFill>
+            <a:schemeClr val="accent1">
+              <a:alpha val="68000"/>
+            </a:schemeClr>
+          </a:solidFill>
+        </p:spPr>
+        <p:style>
+          <a:lnRef idx="2">
+            <a:schemeClr val="accent1">
+              <a:shade val="50000"/>
+            </a:schemeClr>
+          </a:lnRef>
+          <a:fillRef idx="1">
+            <a:schemeClr val="accent1"/>
+          </a:fillRef>
+          <a:effectRef idx="0">
+            <a:schemeClr val="accent1"/>
+          </a:effectRef>
+          <a:fontRef idx="minor">
+            <a:schemeClr val="lt1"/>
+          </a:fontRef>
+        </p:style>
+        <p:txBody>
+          <a:bodyPr rtlCol="0" anchor="ctr"/>
+          <a:lstStyle/>
+          <a:p>
+            <a:pPr algn="ctr"/>
+            <a:r>
+              <a:rPr lang="fr-FR" sz="2000" b="1" u="sng" dirty="0">
+                <a:solidFill>
+                  <a:schemeClr val="tx1"/>
+                </a:solidFill>
+              </a:rPr>
+              <a:t>- Chemin de fer -</a:t>
             </a:r>
           </a:p>
         </p:txBody>
@@ -34949,6 +35814,64 @@
           </a:p>
         </p:txBody>
       </p:sp>
+      <p:sp>
+        <p:nvSpPr>
+          <p:cNvPr id="51" name="Rectangle 50">
+            <a:extLst>
+              <a:ext uri="{FF2B5EF4-FFF2-40B4-BE49-F238E27FC236}">
+                <a16:creationId xmlns:a16="http://schemas.microsoft.com/office/drawing/2014/main" id="{8E16915E-48D9-485B-A6EB-414830D1121A}"/>
+              </a:ext>
+            </a:extLst>
+          </p:cNvPr>
+          <p:cNvSpPr/>
+          <p:nvPr/>
+        </p:nvSpPr>
+        <p:spPr>
+          <a:xfrm>
+            <a:off x="9714921" y="0"/>
+            <a:ext cx="2477079" cy="6858000"/>
+          </a:xfrm>
+          <a:prstGeom prst="rect">
+            <a:avLst/>
+          </a:prstGeom>
+          <a:solidFill>
+            <a:schemeClr val="accent1">
+              <a:alpha val="68000"/>
+            </a:schemeClr>
+          </a:solidFill>
+        </p:spPr>
+        <p:style>
+          <a:lnRef idx="2">
+            <a:schemeClr val="accent1">
+              <a:shade val="50000"/>
+            </a:schemeClr>
+          </a:lnRef>
+          <a:fillRef idx="1">
+            <a:schemeClr val="accent1"/>
+          </a:fillRef>
+          <a:effectRef idx="0">
+            <a:schemeClr val="accent1"/>
+          </a:effectRef>
+          <a:fontRef idx="minor">
+            <a:schemeClr val="lt1"/>
+          </a:fontRef>
+        </p:style>
+        <p:txBody>
+          <a:bodyPr rtlCol="0" anchor="ctr"/>
+          <a:lstStyle/>
+          <a:p>
+            <a:pPr algn="ctr"/>
+            <a:r>
+              <a:rPr lang="fr-FR" sz="2000" b="1" u="sng" dirty="0">
+                <a:solidFill>
+                  <a:schemeClr val="tx1"/>
+                </a:solidFill>
+              </a:rPr>
+              <a:t>- Chemin de fer -</a:t>
+            </a:r>
+          </a:p>
+        </p:txBody>
+      </p:sp>
     </p:spTree>
     <p:extLst>
       <p:ext uri="{BB962C8B-B14F-4D97-AF65-F5344CB8AC3E}">
@@ -38072,6 +38995,64 @@
           </a:p>
         </p:txBody>
       </p:sp>
+      <p:sp>
+        <p:nvSpPr>
+          <p:cNvPr id="73" name="Rectangle 72">
+            <a:extLst>
+              <a:ext uri="{FF2B5EF4-FFF2-40B4-BE49-F238E27FC236}">
+                <a16:creationId xmlns:a16="http://schemas.microsoft.com/office/drawing/2014/main" id="{E8875F5F-E965-4EBA-A879-51A16A0D206D}"/>
+              </a:ext>
+            </a:extLst>
+          </p:cNvPr>
+          <p:cNvSpPr/>
+          <p:nvPr/>
+        </p:nvSpPr>
+        <p:spPr>
+          <a:xfrm>
+            <a:off x="9714921" y="0"/>
+            <a:ext cx="2477079" cy="6858000"/>
+          </a:xfrm>
+          <a:prstGeom prst="rect">
+            <a:avLst/>
+          </a:prstGeom>
+          <a:solidFill>
+            <a:schemeClr val="accent1">
+              <a:alpha val="68000"/>
+            </a:schemeClr>
+          </a:solidFill>
+        </p:spPr>
+        <p:style>
+          <a:lnRef idx="2">
+            <a:schemeClr val="accent1">
+              <a:shade val="50000"/>
+            </a:schemeClr>
+          </a:lnRef>
+          <a:fillRef idx="1">
+            <a:schemeClr val="accent1"/>
+          </a:fillRef>
+          <a:effectRef idx="0">
+            <a:schemeClr val="accent1"/>
+          </a:effectRef>
+          <a:fontRef idx="minor">
+            <a:schemeClr val="lt1"/>
+          </a:fontRef>
+        </p:style>
+        <p:txBody>
+          <a:bodyPr rtlCol="0" anchor="ctr"/>
+          <a:lstStyle/>
+          <a:p>
+            <a:pPr algn="ctr"/>
+            <a:r>
+              <a:rPr lang="fr-FR" sz="2000" b="1" u="sng" dirty="0">
+                <a:solidFill>
+                  <a:schemeClr val="tx1"/>
+                </a:solidFill>
+              </a:rPr>
+              <a:t>- Chemin de fer -</a:t>
+            </a:r>
+          </a:p>
+        </p:txBody>
+      </p:sp>
     </p:spTree>
     <p:extLst>
       <p:ext uri="{BB962C8B-B14F-4D97-AF65-F5344CB8AC3E}">
@@ -40275,6 +41256,64 @@
           </a:prstGeom>
         </p:spPr>
       </p:pic>
+      <p:sp>
+        <p:nvSpPr>
+          <p:cNvPr id="44" name="Rectangle 43">
+            <a:extLst>
+              <a:ext uri="{FF2B5EF4-FFF2-40B4-BE49-F238E27FC236}">
+                <a16:creationId xmlns:a16="http://schemas.microsoft.com/office/drawing/2014/main" id="{148EE433-B31E-4BD0-A4B8-06E5AC89D6A4}"/>
+              </a:ext>
+            </a:extLst>
+          </p:cNvPr>
+          <p:cNvSpPr/>
+          <p:nvPr/>
+        </p:nvSpPr>
+        <p:spPr>
+          <a:xfrm>
+            <a:off x="9714921" y="0"/>
+            <a:ext cx="2477079" cy="6858000"/>
+          </a:xfrm>
+          <a:prstGeom prst="rect">
+            <a:avLst/>
+          </a:prstGeom>
+          <a:solidFill>
+            <a:schemeClr val="accent1">
+              <a:alpha val="68000"/>
+            </a:schemeClr>
+          </a:solidFill>
+        </p:spPr>
+        <p:style>
+          <a:lnRef idx="2">
+            <a:schemeClr val="accent1">
+              <a:shade val="50000"/>
+            </a:schemeClr>
+          </a:lnRef>
+          <a:fillRef idx="1">
+            <a:schemeClr val="accent1"/>
+          </a:fillRef>
+          <a:effectRef idx="0">
+            <a:schemeClr val="accent1"/>
+          </a:effectRef>
+          <a:fontRef idx="minor">
+            <a:schemeClr val="lt1"/>
+          </a:fontRef>
+        </p:style>
+        <p:txBody>
+          <a:bodyPr rtlCol="0" anchor="ctr"/>
+          <a:lstStyle/>
+          <a:p>
+            <a:pPr algn="ctr"/>
+            <a:r>
+              <a:rPr lang="fr-FR" sz="2000" b="1" u="sng" dirty="0">
+                <a:solidFill>
+                  <a:schemeClr val="tx1"/>
+                </a:solidFill>
+              </a:rPr>
+              <a:t>- Chemin de fer -</a:t>
+            </a:r>
+          </a:p>
+        </p:txBody>
+      </p:sp>
     </p:spTree>
     <p:extLst>
       <p:ext uri="{BB962C8B-B14F-4D97-AF65-F5344CB8AC3E}">
@@ -42640,6 +43679,64 @@
                 </a:effectLst>
               </a:rPr>
               <a:t>7</a:t>
+            </a:r>
+          </a:p>
+        </p:txBody>
+      </p:sp>
+      <p:sp>
+        <p:nvSpPr>
+          <p:cNvPr id="50" name="Rectangle 49">
+            <a:extLst>
+              <a:ext uri="{FF2B5EF4-FFF2-40B4-BE49-F238E27FC236}">
+                <a16:creationId xmlns:a16="http://schemas.microsoft.com/office/drawing/2014/main" id="{AB60094B-8F6E-4F1C-A7C4-0FE9784CB617}"/>
+              </a:ext>
+            </a:extLst>
+          </p:cNvPr>
+          <p:cNvSpPr/>
+          <p:nvPr/>
+        </p:nvSpPr>
+        <p:spPr>
+          <a:xfrm>
+            <a:off x="9714921" y="0"/>
+            <a:ext cx="2477079" cy="6858000"/>
+          </a:xfrm>
+          <a:prstGeom prst="rect">
+            <a:avLst/>
+          </a:prstGeom>
+          <a:solidFill>
+            <a:schemeClr val="accent1">
+              <a:alpha val="68000"/>
+            </a:schemeClr>
+          </a:solidFill>
+        </p:spPr>
+        <p:style>
+          <a:lnRef idx="2">
+            <a:schemeClr val="accent1">
+              <a:shade val="50000"/>
+            </a:schemeClr>
+          </a:lnRef>
+          <a:fillRef idx="1">
+            <a:schemeClr val="accent1"/>
+          </a:fillRef>
+          <a:effectRef idx="0">
+            <a:schemeClr val="accent1"/>
+          </a:effectRef>
+          <a:fontRef idx="minor">
+            <a:schemeClr val="lt1"/>
+          </a:fontRef>
+        </p:style>
+        <p:txBody>
+          <a:bodyPr rtlCol="0" anchor="ctr"/>
+          <a:lstStyle/>
+          <a:p>
+            <a:pPr algn="ctr"/>
+            <a:r>
+              <a:rPr lang="fr-FR" sz="2000" b="1" u="sng" dirty="0">
+                <a:solidFill>
+                  <a:schemeClr val="tx1"/>
+                </a:solidFill>
+              </a:rPr>
+              <a:t>- Chemin de fer -</a:t>
             </a:r>
           </a:p>
         </p:txBody>
@@ -44917,6 +46014,64 @@
           </a:p>
         </p:txBody>
       </p:sp>
+      <p:sp>
+        <p:nvSpPr>
+          <p:cNvPr id="45" name="Rectangle 44">
+            <a:extLst>
+              <a:ext uri="{FF2B5EF4-FFF2-40B4-BE49-F238E27FC236}">
+                <a16:creationId xmlns:a16="http://schemas.microsoft.com/office/drawing/2014/main" id="{A61A93DF-D36C-46FA-B7E8-AB2339E35538}"/>
+              </a:ext>
+            </a:extLst>
+          </p:cNvPr>
+          <p:cNvSpPr/>
+          <p:nvPr/>
+        </p:nvSpPr>
+        <p:spPr>
+          <a:xfrm>
+            <a:off x="9714921" y="0"/>
+            <a:ext cx="2477079" cy="6858000"/>
+          </a:xfrm>
+          <a:prstGeom prst="rect">
+            <a:avLst/>
+          </a:prstGeom>
+          <a:solidFill>
+            <a:schemeClr val="accent1">
+              <a:alpha val="68000"/>
+            </a:schemeClr>
+          </a:solidFill>
+        </p:spPr>
+        <p:style>
+          <a:lnRef idx="2">
+            <a:schemeClr val="accent1">
+              <a:shade val="50000"/>
+            </a:schemeClr>
+          </a:lnRef>
+          <a:fillRef idx="1">
+            <a:schemeClr val="accent1"/>
+          </a:fillRef>
+          <a:effectRef idx="0">
+            <a:schemeClr val="accent1"/>
+          </a:effectRef>
+          <a:fontRef idx="minor">
+            <a:schemeClr val="lt1"/>
+          </a:fontRef>
+        </p:style>
+        <p:txBody>
+          <a:bodyPr rtlCol="0" anchor="ctr"/>
+          <a:lstStyle/>
+          <a:p>
+            <a:pPr algn="ctr"/>
+            <a:r>
+              <a:rPr lang="fr-FR" sz="2000" b="1" u="sng" dirty="0">
+                <a:solidFill>
+                  <a:schemeClr val="tx1"/>
+                </a:solidFill>
+              </a:rPr>
+              <a:t>- Chemin de fer -</a:t>
+            </a:r>
+          </a:p>
+        </p:txBody>
+      </p:sp>
     </p:spTree>
     <p:extLst>
       <p:ext uri="{BB962C8B-B14F-4D97-AF65-F5344CB8AC3E}">
@@ -47110,8 +48265,8 @@
         </p:blipFill>
         <p:spPr>
           <a:xfrm>
-            <a:off x="3158942" y="1584132"/>
-            <a:ext cx="4407431" cy="4563281"/>
+            <a:off x="143291" y="1346027"/>
+            <a:ext cx="3900923" cy="4038863"/>
           </a:xfrm>
           <a:prstGeom prst="rect">
             <a:avLst/>
@@ -47128,6 +48283,64 @@
           </a:effectLst>
         </p:spPr>
       </p:pic>
+      <p:sp>
+        <p:nvSpPr>
+          <p:cNvPr id="46" name="Rectangle 45">
+            <a:extLst>
+              <a:ext uri="{FF2B5EF4-FFF2-40B4-BE49-F238E27FC236}">
+                <a16:creationId xmlns:a16="http://schemas.microsoft.com/office/drawing/2014/main" id="{C6B79C9A-69C2-4B2D-BB96-BF1D8AD01AB2}"/>
+              </a:ext>
+            </a:extLst>
+          </p:cNvPr>
+          <p:cNvSpPr/>
+          <p:nvPr/>
+        </p:nvSpPr>
+        <p:spPr>
+          <a:xfrm>
+            <a:off x="9714921" y="0"/>
+            <a:ext cx="2477079" cy="6858000"/>
+          </a:xfrm>
+          <a:prstGeom prst="rect">
+            <a:avLst/>
+          </a:prstGeom>
+          <a:solidFill>
+            <a:schemeClr val="accent1">
+              <a:alpha val="68000"/>
+            </a:schemeClr>
+          </a:solidFill>
+        </p:spPr>
+        <p:style>
+          <a:lnRef idx="2">
+            <a:schemeClr val="accent1">
+              <a:shade val="50000"/>
+            </a:schemeClr>
+          </a:lnRef>
+          <a:fillRef idx="1">
+            <a:schemeClr val="accent1"/>
+          </a:fillRef>
+          <a:effectRef idx="0">
+            <a:schemeClr val="accent1"/>
+          </a:effectRef>
+          <a:fontRef idx="minor">
+            <a:schemeClr val="lt1"/>
+          </a:fontRef>
+        </p:style>
+        <p:txBody>
+          <a:bodyPr rtlCol="0" anchor="ctr"/>
+          <a:lstStyle/>
+          <a:p>
+            <a:pPr algn="ctr"/>
+            <a:r>
+              <a:rPr lang="fr-FR" sz="2000" b="1" u="sng" dirty="0">
+                <a:solidFill>
+                  <a:schemeClr val="tx1"/>
+                </a:solidFill>
+              </a:rPr>
+              <a:t>- Chemin de fer -</a:t>
+            </a:r>
+          </a:p>
+        </p:txBody>
+      </p:sp>
     </p:spTree>
     <p:extLst>
       <p:ext uri="{BB962C8B-B14F-4D97-AF65-F5344CB8AC3E}">

</xml_diff>

<commit_message>
Apport de modifications dans l'application (camera IP), poursuite du diaporama de revue finale.
</commit_message>
<xml_diff>
--- a/Nathan/Compte-rendus/REVUE-FINALE-GUIGAND-SFL6.pptx
+++ b/Nathan/Compte-rendus/REVUE-FINALE-GUIGAND-SFL6.pptx
@@ -3974,7 +3974,7 @@
             <a:fld id="{B61BEF0D-F0BB-DE4B-95CE-6DB70DBA9567}" type="datetimeFigureOut">
               <a:rPr lang="en-US" dirty="0"/>
               <a:pPr/>
-              <a:t>6/3/2020</a:t>
+              <a:t>6/4/2020</a:t>
             </a:fld>
             <a:endParaRPr lang="en-US" dirty="0"/>
           </a:p>
@@ -4222,7 +4222,7 @@
             <a:fld id="{B61BEF0D-F0BB-DE4B-95CE-6DB70DBA9567}" type="datetimeFigureOut">
               <a:rPr lang="en-US" dirty="0"/>
               <a:pPr/>
-              <a:t>6/3/2020</a:t>
+              <a:t>6/4/2020</a:t>
             </a:fld>
             <a:endParaRPr lang="en-US" dirty="0"/>
           </a:p>
@@ -4533,7 +4533,7 @@
             <a:fld id="{B61BEF0D-F0BB-DE4B-95CE-6DB70DBA9567}" type="datetimeFigureOut">
               <a:rPr lang="en-US" dirty="0"/>
               <a:pPr/>
-              <a:t>6/3/2020</a:t>
+              <a:t>6/4/2020</a:t>
             </a:fld>
             <a:endParaRPr lang="en-US" dirty="0"/>
           </a:p>
@@ -4871,7 +4871,7 @@
             <a:fld id="{B61BEF0D-F0BB-DE4B-95CE-6DB70DBA9567}" type="datetimeFigureOut">
               <a:rPr lang="en-US" dirty="0"/>
               <a:pPr/>
-              <a:t>6/3/2020</a:t>
+              <a:t>6/4/2020</a:t>
             </a:fld>
             <a:endParaRPr lang="en-US" dirty="0"/>
           </a:p>
@@ -5182,7 +5182,7 @@
             <a:fld id="{B61BEF0D-F0BB-DE4B-95CE-6DB70DBA9567}" type="datetimeFigureOut">
               <a:rPr lang="en-US" dirty="0"/>
               <a:pPr/>
-              <a:t>6/3/2020</a:t>
+              <a:t>6/4/2020</a:t>
             </a:fld>
             <a:endParaRPr lang="en-US" dirty="0"/>
           </a:p>
@@ -5572,7 +5572,7 @@
             <a:fld id="{B61BEF0D-F0BB-DE4B-95CE-6DB70DBA9567}" type="datetimeFigureOut">
               <a:rPr lang="en-US" dirty="0"/>
               <a:pPr/>
-              <a:t>6/3/2020</a:t>
+              <a:t>6/4/2020</a:t>
             </a:fld>
             <a:endParaRPr lang="en-US" dirty="0"/>
           </a:p>
@@ -5738,7 +5738,7 @@
           <a:p>
             <a:fld id="{55C6B4A9-1611-4792-9094-5F34BCA07E0B}" type="datetimeFigureOut">
               <a:rPr lang="en-US" dirty="0"/>
-              <a:t>6/3/2020</a:t>
+              <a:t>6/4/2020</a:t>
             </a:fld>
             <a:endParaRPr lang="en-US" dirty="0"/>
           </a:p>
@@ -5914,7 +5914,7 @@
             <a:fld id="{B61BEF0D-F0BB-DE4B-95CE-6DB70DBA9567}" type="datetimeFigureOut">
               <a:rPr lang="en-US" dirty="0"/>
               <a:pPr/>
-              <a:t>6/3/2020</a:t>
+              <a:t>6/4/2020</a:t>
             </a:fld>
             <a:endParaRPr lang="en-US" dirty="0"/>
           </a:p>
@@ -6087,7 +6087,7 @@
             <a:fld id="{B61BEF0D-F0BB-DE4B-95CE-6DB70DBA9567}" type="datetimeFigureOut">
               <a:rPr lang="en-US" dirty="0"/>
               <a:pPr/>
-              <a:t>6/3/2020</a:t>
+              <a:t>6/4/2020</a:t>
             </a:fld>
             <a:endParaRPr lang="en-US" dirty="0"/>
           </a:p>
@@ -6331,7 +6331,7 @@
             <a:fld id="{B61BEF0D-F0BB-DE4B-95CE-6DB70DBA9567}" type="datetimeFigureOut">
               <a:rPr lang="en-US" dirty="0"/>
               <a:pPr/>
-              <a:t>6/3/2020</a:t>
+              <a:t>6/4/2020</a:t>
             </a:fld>
             <a:endParaRPr lang="en-US" dirty="0"/>
           </a:p>
@@ -6559,7 +6559,7 @@
           <a:p>
             <a:fld id="{EB712588-04B1-427B-82EE-E8DB90309F08}" type="datetimeFigureOut">
               <a:rPr lang="en-US" dirty="0"/>
-              <a:t>6/3/2020</a:t>
+              <a:t>6/4/2020</a:t>
             </a:fld>
             <a:endParaRPr lang="en-US" dirty="0"/>
           </a:p>
@@ -6929,7 +6929,7 @@
             <a:fld id="{B61BEF0D-F0BB-DE4B-95CE-6DB70DBA9567}" type="datetimeFigureOut">
               <a:rPr lang="en-US" dirty="0"/>
               <a:pPr/>
-              <a:t>6/3/2020</a:t>
+              <a:t>6/4/2020</a:t>
             </a:fld>
             <a:endParaRPr lang="en-US" dirty="0"/>
           </a:p>
@@ -7049,7 +7049,7 @@
             <a:fld id="{B61BEF0D-F0BB-DE4B-95CE-6DB70DBA9567}" type="datetimeFigureOut">
               <a:rPr lang="en-US" dirty="0"/>
               <a:pPr/>
-              <a:t>6/3/2020</a:t>
+              <a:t>6/4/2020</a:t>
             </a:fld>
             <a:endParaRPr lang="en-US" dirty="0"/>
           </a:p>
@@ -7141,7 +7141,7 @@
             <a:fld id="{B61BEF0D-F0BB-DE4B-95CE-6DB70DBA9567}" type="datetimeFigureOut">
               <a:rPr lang="en-US" dirty="0"/>
               <a:pPr/>
-              <a:t>6/3/2020</a:t>
+              <a:t>6/4/2020</a:t>
             </a:fld>
             <a:endParaRPr lang="en-US" dirty="0"/>
           </a:p>
@@ -7392,7 +7392,7 @@
           <a:p>
             <a:fld id="{42A54C80-263E-416B-A8E0-580EDEADCBDC}" type="datetimeFigureOut">
               <a:rPr lang="en-US" dirty="0"/>
-              <a:t>6/3/2020</a:t>
+              <a:t>6/4/2020</a:t>
             </a:fld>
             <a:endParaRPr lang="en-US" dirty="0"/>
           </a:p>
@@ -7651,7 +7651,7 @@
             <a:fld id="{B61BEF0D-F0BB-DE4B-95CE-6DB70DBA9567}" type="datetimeFigureOut">
               <a:rPr lang="en-US" dirty="0"/>
               <a:pPr/>
-              <a:t>6/3/2020</a:t>
+              <a:t>6/4/2020</a:t>
             </a:fld>
             <a:endParaRPr lang="en-US" dirty="0"/>
           </a:p>
@@ -8391,7 +8391,7 @@
             <a:fld id="{B61BEF0D-F0BB-DE4B-95CE-6DB70DBA9567}" type="datetimeFigureOut">
               <a:rPr lang="en-US" dirty="0"/>
               <a:pPr/>
-              <a:t>6/3/2020</a:t>
+              <a:t>6/4/2020</a:t>
             </a:fld>
             <a:endParaRPr lang="en-US" dirty="0"/>
           </a:p>
@@ -21598,6 +21598,559 @@
           </a:extLst>
         </p:spPr>
       </p:pic>
+      <p:pic>
+        <p:nvPicPr>
+          <p:cNvPr id="5" name="Image 4">
+            <a:extLst>
+              <a:ext uri="{FF2B5EF4-FFF2-40B4-BE49-F238E27FC236}">
+                <a16:creationId xmlns:a16="http://schemas.microsoft.com/office/drawing/2014/main" id="{B9A7C055-03D6-48F9-B2F5-4045BC0F8690}"/>
+              </a:ext>
+            </a:extLst>
+          </p:cNvPr>
+          <p:cNvPicPr>
+            <a:picLocks noChangeAspect="1"/>
+          </p:cNvPicPr>
+          <p:nvPr/>
+        </p:nvPicPr>
+        <p:blipFill rotWithShape="1">
+          <a:blip r:embed="rId3"/>
+          <a:srcRect l="17653" t="32197" r="21193" b="8082"/>
+          <a:stretch/>
+        </p:blipFill>
+        <p:spPr>
+          <a:xfrm>
+            <a:off x="0" y="828980"/>
+            <a:ext cx="6116687" cy="3358407"/>
+          </a:xfrm>
+          <a:prstGeom prst="rect">
+            <a:avLst/>
+          </a:prstGeom>
+        </p:spPr>
+      </p:pic>
+      <p:pic>
+        <p:nvPicPr>
+          <p:cNvPr id="6" name="Image 5">
+            <a:extLst>
+              <a:ext uri="{FF2B5EF4-FFF2-40B4-BE49-F238E27FC236}">
+                <a16:creationId xmlns:a16="http://schemas.microsoft.com/office/drawing/2014/main" id="{5B7DDEF3-195E-4126-AEAF-73637C726B1E}"/>
+              </a:ext>
+            </a:extLst>
+          </p:cNvPr>
+          <p:cNvPicPr>
+            <a:picLocks noChangeAspect="1"/>
+          </p:cNvPicPr>
+          <p:nvPr/>
+        </p:nvPicPr>
+        <p:blipFill rotWithShape="1">
+          <a:blip r:embed="rId4"/>
+          <a:srcRect l="40615" t="37122" r="12769" b="47897"/>
+          <a:stretch/>
+        </p:blipFill>
+        <p:spPr>
+          <a:xfrm>
+            <a:off x="433340" y="4418076"/>
+            <a:ext cx="5683347" cy="1026942"/>
+          </a:xfrm>
+          <a:prstGeom prst="rect">
+            <a:avLst/>
+          </a:prstGeom>
+        </p:spPr>
+      </p:pic>
+      <p:pic>
+        <p:nvPicPr>
+          <p:cNvPr id="7" name="Image 6">
+            <a:extLst>
+              <a:ext uri="{FF2B5EF4-FFF2-40B4-BE49-F238E27FC236}">
+                <a16:creationId xmlns:a16="http://schemas.microsoft.com/office/drawing/2014/main" id="{6BF11392-0736-4AAB-BE78-FD9C18DB9C06}"/>
+              </a:ext>
+            </a:extLst>
+          </p:cNvPr>
+          <p:cNvPicPr>
+            <a:picLocks noChangeAspect="1"/>
+          </p:cNvPicPr>
+          <p:nvPr/>
+        </p:nvPicPr>
+        <p:blipFill>
+          <a:blip r:embed="rId5"/>
+          <a:stretch>
+            <a:fillRect/>
+          </a:stretch>
+        </p:blipFill>
+        <p:spPr>
+          <a:xfrm>
+            <a:off x="2280563" y="5503483"/>
+            <a:ext cx="2210928" cy="1211082"/>
+          </a:xfrm>
+          <a:prstGeom prst="rect">
+            <a:avLst/>
+          </a:prstGeom>
+        </p:spPr>
+      </p:pic>
+      <p:sp>
+        <p:nvSpPr>
+          <p:cNvPr id="8" name="Rectangle : coins arrondis 7">
+            <a:extLst>
+              <a:ext uri="{FF2B5EF4-FFF2-40B4-BE49-F238E27FC236}">
+                <a16:creationId xmlns:a16="http://schemas.microsoft.com/office/drawing/2014/main" id="{F5F01913-A4CD-4181-B6AE-333F4117A96A}"/>
+              </a:ext>
+            </a:extLst>
+          </p:cNvPr>
+          <p:cNvSpPr/>
+          <p:nvPr/>
+        </p:nvSpPr>
+        <p:spPr>
+          <a:xfrm>
+            <a:off x="6380396" y="1012874"/>
+            <a:ext cx="45719" cy="5514535"/>
+          </a:xfrm>
+          <a:prstGeom prst="roundRect">
+            <a:avLst/>
+          </a:prstGeom>
+          <a:solidFill>
+            <a:srgbClr val="A41258"/>
+          </a:solidFill>
+          <a:ln>
+            <a:solidFill>
+              <a:srgbClr val="A31257"/>
+            </a:solidFill>
+          </a:ln>
+        </p:spPr>
+        <p:style>
+          <a:lnRef idx="2">
+            <a:schemeClr val="accent1">
+              <a:shade val="50000"/>
+            </a:schemeClr>
+          </a:lnRef>
+          <a:fillRef idx="1">
+            <a:schemeClr val="accent1"/>
+          </a:fillRef>
+          <a:effectRef idx="0">
+            <a:schemeClr val="accent1"/>
+          </a:effectRef>
+          <a:fontRef idx="minor">
+            <a:schemeClr val="lt1"/>
+          </a:fontRef>
+        </p:style>
+        <p:txBody>
+          <a:bodyPr rtlCol="0" anchor="ctr"/>
+          <a:lstStyle/>
+          <a:p>
+            <a:pPr algn="ctr"/>
+            <a:endParaRPr lang="fr-FR"/>
+          </a:p>
+        </p:txBody>
+      </p:sp>
+      <p:sp>
+        <p:nvSpPr>
+          <p:cNvPr id="9" name="Rectangle : coins arrondis 8">
+            <a:extLst>
+              <a:ext uri="{FF2B5EF4-FFF2-40B4-BE49-F238E27FC236}">
+                <a16:creationId xmlns:a16="http://schemas.microsoft.com/office/drawing/2014/main" id="{C2D8AC89-3C24-46F4-859C-6A688B4DE672}"/>
+              </a:ext>
+            </a:extLst>
+          </p:cNvPr>
+          <p:cNvSpPr/>
+          <p:nvPr/>
+        </p:nvSpPr>
+        <p:spPr>
+          <a:xfrm>
+            <a:off x="6403255" y="2462464"/>
+            <a:ext cx="1472501" cy="45719"/>
+          </a:xfrm>
+          <a:prstGeom prst="roundRect">
+            <a:avLst/>
+          </a:prstGeom>
+          <a:solidFill>
+            <a:srgbClr val="A41258"/>
+          </a:solidFill>
+          <a:ln>
+            <a:solidFill>
+              <a:srgbClr val="A31257"/>
+            </a:solidFill>
+          </a:ln>
+        </p:spPr>
+        <p:style>
+          <a:lnRef idx="2">
+            <a:schemeClr val="accent1">
+              <a:shade val="50000"/>
+            </a:schemeClr>
+          </a:lnRef>
+          <a:fillRef idx="1">
+            <a:schemeClr val="accent1"/>
+          </a:fillRef>
+          <a:effectRef idx="0">
+            <a:schemeClr val="accent1"/>
+          </a:effectRef>
+          <a:fontRef idx="minor">
+            <a:schemeClr val="lt1"/>
+          </a:fontRef>
+        </p:style>
+        <p:txBody>
+          <a:bodyPr rtlCol="0" anchor="ctr"/>
+          <a:lstStyle/>
+          <a:p>
+            <a:pPr algn="ctr"/>
+            <a:endParaRPr lang="fr-FR"/>
+          </a:p>
+        </p:txBody>
+      </p:sp>
+      <p:sp>
+        <p:nvSpPr>
+          <p:cNvPr id="10" name="Rectangle : coins arrondis 9">
+            <a:extLst>
+              <a:ext uri="{FF2B5EF4-FFF2-40B4-BE49-F238E27FC236}">
+                <a16:creationId xmlns:a16="http://schemas.microsoft.com/office/drawing/2014/main" id="{A83092F0-E7D9-4FA8-A155-990C123B0AB4}"/>
+              </a:ext>
+            </a:extLst>
+          </p:cNvPr>
+          <p:cNvSpPr/>
+          <p:nvPr/>
+        </p:nvSpPr>
+        <p:spPr>
+          <a:xfrm>
+            <a:off x="6426115" y="4338406"/>
+            <a:ext cx="1472501" cy="45719"/>
+          </a:xfrm>
+          <a:prstGeom prst="roundRect">
+            <a:avLst/>
+          </a:prstGeom>
+          <a:solidFill>
+            <a:srgbClr val="A41258"/>
+          </a:solidFill>
+          <a:ln>
+            <a:solidFill>
+              <a:srgbClr val="A31257"/>
+            </a:solidFill>
+          </a:ln>
+        </p:spPr>
+        <p:style>
+          <a:lnRef idx="2">
+            <a:schemeClr val="accent1">
+              <a:shade val="50000"/>
+            </a:schemeClr>
+          </a:lnRef>
+          <a:fillRef idx="1">
+            <a:schemeClr val="accent1"/>
+          </a:fillRef>
+          <a:effectRef idx="0">
+            <a:schemeClr val="accent1"/>
+          </a:effectRef>
+          <a:fontRef idx="minor">
+            <a:schemeClr val="lt1"/>
+          </a:fontRef>
+        </p:style>
+        <p:txBody>
+          <a:bodyPr rtlCol="0" anchor="ctr"/>
+          <a:lstStyle/>
+          <a:p>
+            <a:pPr algn="ctr"/>
+            <a:endParaRPr lang="fr-FR"/>
+          </a:p>
+        </p:txBody>
+      </p:sp>
+      <p:pic>
+        <p:nvPicPr>
+          <p:cNvPr id="11" name="Image 10">
+            <a:extLst>
+              <a:ext uri="{FF2B5EF4-FFF2-40B4-BE49-F238E27FC236}">
+                <a16:creationId xmlns:a16="http://schemas.microsoft.com/office/drawing/2014/main" id="{CD613575-9AFB-4D62-9BA0-C51C218F475B}"/>
+              </a:ext>
+            </a:extLst>
+          </p:cNvPr>
+          <p:cNvPicPr>
+            <a:picLocks noChangeAspect="1"/>
+          </p:cNvPicPr>
+          <p:nvPr/>
+        </p:nvPicPr>
+        <p:blipFill>
+          <a:blip r:embed="rId6"/>
+          <a:stretch>
+            <a:fillRect/>
+          </a:stretch>
+        </p:blipFill>
+        <p:spPr>
+          <a:xfrm>
+            <a:off x="6610977" y="1304078"/>
+            <a:ext cx="2689750" cy="1093294"/>
+          </a:xfrm>
+          <a:prstGeom prst="rect">
+            <a:avLst/>
+          </a:prstGeom>
+        </p:spPr>
+      </p:pic>
+      <p:sp>
+        <p:nvSpPr>
+          <p:cNvPr id="12" name="ZoneTexte 11">
+            <a:extLst>
+              <a:ext uri="{FF2B5EF4-FFF2-40B4-BE49-F238E27FC236}">
+                <a16:creationId xmlns:a16="http://schemas.microsoft.com/office/drawing/2014/main" id="{1887457B-7DE1-4AC4-A69C-D32BD9C5D8EF}"/>
+              </a:ext>
+            </a:extLst>
+          </p:cNvPr>
+          <p:cNvSpPr txBox="1"/>
+          <p:nvPr/>
+        </p:nvSpPr>
+        <p:spPr>
+          <a:xfrm>
+            <a:off x="6505673" y="900432"/>
+            <a:ext cx="1537061" cy="338554"/>
+          </a:xfrm>
+          <a:prstGeom prst="rect">
+            <a:avLst/>
+          </a:prstGeom>
+          <a:noFill/>
+          <a:ln>
+            <a:noFill/>
+          </a:ln>
+          <a:effectLst>
+            <a:glow rad="63500">
+              <a:schemeClr val="accent4">
+                <a:satMod val="175000"/>
+                <a:alpha val="40000"/>
+              </a:schemeClr>
+            </a:glow>
+            <a:outerShdw blurRad="50800" dist="38100" dir="5400000" algn="t" rotWithShape="0">
+              <a:prstClr val="black">
+                <a:alpha val="40000"/>
+              </a:prstClr>
+            </a:outerShdw>
+          </a:effectLst>
+          <a:scene3d>
+            <a:camera prst="orthographicFront">
+              <a:rot lat="0" lon="0" rev="0"/>
+            </a:camera>
+            <a:lightRig rig="soft" dir="t">
+              <a:rot lat="0" lon="0" rev="0"/>
+            </a:lightRig>
+          </a:scene3d>
+          <a:sp3d contourW="44450" prstMaterial="matte">
+            <a:bevelT w="63500" h="63500" prst="artDeco"/>
+            <a:contourClr>
+              <a:srgbClr val="FFFFFF"/>
+            </a:contourClr>
+          </a:sp3d>
+        </p:spPr>
+        <p:txBody>
+          <a:bodyPr wrap="square" rtlCol="0">
+            <a:spAutoFit/>
+          </a:bodyPr>
+          <a:lstStyle/>
+          <a:p>
+            <a:pPr algn="ctr"/>
+            <a:r>
+              <a:rPr lang="fr-FR" sz="1600" dirty="0">
+                <a:latin typeface="Eras Medium ITC" panose="020B0602030504020804" pitchFamily="34" charset="0"/>
+              </a:rPr>
+              <a:t>Camera IP :</a:t>
+            </a:r>
+            <a:endParaRPr lang="fr-FR" sz="1400" dirty="0">
+              <a:latin typeface="Eras Medium ITC" panose="020B0602030504020804" pitchFamily="34" charset="0"/>
+            </a:endParaRPr>
+          </a:p>
+        </p:txBody>
+      </p:sp>
+      <p:sp>
+        <p:nvSpPr>
+          <p:cNvPr id="13" name="ZoneTexte 12">
+            <a:extLst>
+              <a:ext uri="{FF2B5EF4-FFF2-40B4-BE49-F238E27FC236}">
+                <a16:creationId xmlns:a16="http://schemas.microsoft.com/office/drawing/2014/main" id="{E4A2593B-48E6-4A5D-8700-D6F51434F851}"/>
+              </a:ext>
+            </a:extLst>
+          </p:cNvPr>
+          <p:cNvSpPr txBox="1"/>
+          <p:nvPr/>
+        </p:nvSpPr>
+        <p:spPr>
+          <a:xfrm>
+            <a:off x="6610977" y="2559022"/>
+            <a:ext cx="1537061" cy="338554"/>
+          </a:xfrm>
+          <a:prstGeom prst="rect">
+            <a:avLst/>
+          </a:prstGeom>
+          <a:noFill/>
+          <a:ln>
+            <a:noFill/>
+          </a:ln>
+          <a:effectLst>
+            <a:glow rad="63500">
+              <a:schemeClr val="accent4">
+                <a:satMod val="175000"/>
+                <a:alpha val="40000"/>
+              </a:schemeClr>
+            </a:glow>
+            <a:outerShdw blurRad="50800" dist="38100" dir="5400000" algn="t" rotWithShape="0">
+              <a:prstClr val="black">
+                <a:alpha val="40000"/>
+              </a:prstClr>
+            </a:outerShdw>
+          </a:effectLst>
+          <a:scene3d>
+            <a:camera prst="orthographicFront">
+              <a:rot lat="0" lon="0" rev="0"/>
+            </a:camera>
+            <a:lightRig rig="soft" dir="t">
+              <a:rot lat="0" lon="0" rev="0"/>
+            </a:lightRig>
+          </a:scene3d>
+          <a:sp3d contourW="44450" prstMaterial="matte">
+            <a:bevelT w="63500" h="63500" prst="artDeco"/>
+            <a:contourClr>
+              <a:srgbClr val="FFFFFF"/>
+            </a:contourClr>
+          </a:sp3d>
+        </p:spPr>
+        <p:txBody>
+          <a:bodyPr wrap="square" rtlCol="0">
+            <a:spAutoFit/>
+          </a:bodyPr>
+          <a:lstStyle/>
+          <a:p>
+            <a:pPr algn="ctr"/>
+            <a:r>
+              <a:rPr lang="fr-FR" sz="1600" dirty="0">
+                <a:latin typeface="Eras Medium ITC" panose="020B0602030504020804" pitchFamily="34" charset="0"/>
+              </a:rPr>
+              <a:t>Afficheur LCD :</a:t>
+            </a:r>
+            <a:endParaRPr lang="fr-FR" sz="1400" dirty="0">
+              <a:latin typeface="Eras Medium ITC" panose="020B0602030504020804" pitchFamily="34" charset="0"/>
+            </a:endParaRPr>
+          </a:p>
+        </p:txBody>
+      </p:sp>
+      <p:sp>
+        <p:nvSpPr>
+          <p:cNvPr id="14" name="ZoneTexte 13">
+            <a:extLst>
+              <a:ext uri="{FF2B5EF4-FFF2-40B4-BE49-F238E27FC236}">
+                <a16:creationId xmlns:a16="http://schemas.microsoft.com/office/drawing/2014/main" id="{ACCA9EAA-960A-451D-9E5F-AC03343C42DB}"/>
+              </a:ext>
+            </a:extLst>
+          </p:cNvPr>
+          <p:cNvSpPr txBox="1"/>
+          <p:nvPr/>
+        </p:nvSpPr>
+        <p:spPr>
+          <a:xfrm>
+            <a:off x="6549497" y="4467231"/>
+            <a:ext cx="2652518" cy="338554"/>
+          </a:xfrm>
+          <a:prstGeom prst="rect">
+            <a:avLst/>
+          </a:prstGeom>
+          <a:noFill/>
+          <a:ln>
+            <a:noFill/>
+          </a:ln>
+          <a:effectLst>
+            <a:glow rad="63500">
+              <a:schemeClr val="accent4">
+                <a:satMod val="175000"/>
+                <a:alpha val="40000"/>
+              </a:schemeClr>
+            </a:glow>
+            <a:outerShdw blurRad="50800" dist="38100" dir="5400000" algn="t" rotWithShape="0">
+              <a:prstClr val="black">
+                <a:alpha val="40000"/>
+              </a:prstClr>
+            </a:outerShdw>
+          </a:effectLst>
+          <a:scene3d>
+            <a:camera prst="orthographicFront">
+              <a:rot lat="0" lon="0" rev="0"/>
+            </a:camera>
+            <a:lightRig rig="soft" dir="t">
+              <a:rot lat="0" lon="0" rev="0"/>
+            </a:lightRig>
+          </a:scene3d>
+          <a:sp3d contourW="44450" prstMaterial="matte">
+            <a:bevelT w="63500" h="63500" prst="artDeco"/>
+            <a:contourClr>
+              <a:srgbClr val="FFFFFF"/>
+            </a:contourClr>
+          </a:sp3d>
+        </p:spPr>
+        <p:txBody>
+          <a:bodyPr wrap="square" rtlCol="0">
+            <a:spAutoFit/>
+          </a:bodyPr>
+          <a:lstStyle/>
+          <a:p>
+            <a:pPr algn="ctr"/>
+            <a:r>
+              <a:rPr lang="fr-FR" sz="1600" dirty="0">
+                <a:latin typeface="Eras Medium ITC" panose="020B0602030504020804" pitchFamily="34" charset="0"/>
+              </a:rPr>
+              <a:t>Sous-Système Médaillons :</a:t>
+            </a:r>
+            <a:endParaRPr lang="fr-FR" sz="1400" dirty="0">
+              <a:latin typeface="Eras Medium ITC" panose="020B0602030504020804" pitchFamily="34" charset="0"/>
+            </a:endParaRPr>
+          </a:p>
+        </p:txBody>
+      </p:sp>
+      <p:pic>
+        <p:nvPicPr>
+          <p:cNvPr id="15" name="Image 14">
+            <a:extLst>
+              <a:ext uri="{FF2B5EF4-FFF2-40B4-BE49-F238E27FC236}">
+                <a16:creationId xmlns:a16="http://schemas.microsoft.com/office/drawing/2014/main" id="{57C46625-7390-48DF-9955-C8DE226FDA9D}"/>
+              </a:ext>
+            </a:extLst>
+          </p:cNvPr>
+          <p:cNvPicPr>
+            <a:picLocks noChangeAspect="1"/>
+          </p:cNvPicPr>
+          <p:nvPr/>
+        </p:nvPicPr>
+        <p:blipFill>
+          <a:blip r:embed="rId7"/>
+          <a:stretch>
+            <a:fillRect/>
+          </a:stretch>
+        </p:blipFill>
+        <p:spPr>
+          <a:xfrm>
+            <a:off x="6610977" y="2987555"/>
+            <a:ext cx="2652518" cy="1068375"/>
+          </a:xfrm>
+          <a:prstGeom prst="rect">
+            <a:avLst/>
+          </a:prstGeom>
+        </p:spPr>
+      </p:pic>
+      <p:pic>
+        <p:nvPicPr>
+          <p:cNvPr id="16" name="Image 15">
+            <a:extLst>
+              <a:ext uri="{FF2B5EF4-FFF2-40B4-BE49-F238E27FC236}">
+                <a16:creationId xmlns:a16="http://schemas.microsoft.com/office/drawing/2014/main" id="{75071AF3-8316-481C-99F0-FDFE5EA9DF3A}"/>
+              </a:ext>
+            </a:extLst>
+          </p:cNvPr>
+          <p:cNvPicPr>
+            <a:picLocks noChangeAspect="1"/>
+          </p:cNvPicPr>
+          <p:nvPr/>
+        </p:nvPicPr>
+        <p:blipFill>
+          <a:blip r:embed="rId8"/>
+          <a:stretch>
+            <a:fillRect/>
+          </a:stretch>
+        </p:blipFill>
+        <p:spPr>
+          <a:xfrm>
+            <a:off x="6610977" y="4886714"/>
+            <a:ext cx="2652518" cy="1070854"/>
+          </a:xfrm>
+          <a:prstGeom prst="rect">
+            <a:avLst/>
+          </a:prstGeom>
+        </p:spPr>
+      </p:pic>
     </p:spTree>
     <p:extLst>
       <p:ext uri="{BB962C8B-B14F-4D97-AF65-F5344CB8AC3E}">
@@ -21608,6 +22161,261 @@
   <p:clrMapOvr>
     <a:masterClrMapping/>
   </p:clrMapOvr>
+  <p:timing>
+    <p:tnLst>
+      <p:par>
+        <p:cTn id="1" dur="indefinite" restart="never" nodeType="tmRoot">
+          <p:childTnLst>
+            <p:seq concurrent="1" nextAc="seek">
+              <p:cTn id="2" dur="indefinite" nodeType="mainSeq">
+                <p:childTnLst>
+                  <p:par>
+                    <p:cTn id="3" fill="hold">
+                      <p:stCondLst>
+                        <p:cond delay="indefinite"/>
+                      </p:stCondLst>
+                      <p:childTnLst>
+                        <p:par>
+                          <p:cTn id="4" fill="hold">
+                            <p:stCondLst>
+                              <p:cond delay="0"/>
+                            </p:stCondLst>
+                            <p:childTnLst>
+                              <p:par>
+                                <p:cTn id="5" presetID="1" presetClass="entr" presetSubtype="0" fill="hold" nodeType="clickEffect">
+                                  <p:stCondLst>
+                                    <p:cond delay="0"/>
+                                  </p:stCondLst>
+                                  <p:childTnLst>
+                                    <p:set>
+                                      <p:cBhvr>
+                                        <p:cTn id="6" dur="1" fill="hold">
+                                          <p:stCondLst>
+                                            <p:cond delay="0"/>
+                                          </p:stCondLst>
+                                        </p:cTn>
+                                        <p:tgtEl>
+                                          <p:spTgt spid="6"/>
+                                        </p:tgtEl>
+                                        <p:attrNameLst>
+                                          <p:attrName>style.visibility</p:attrName>
+                                        </p:attrNameLst>
+                                      </p:cBhvr>
+                                      <p:to>
+                                        <p:strVal val="visible"/>
+                                      </p:to>
+                                    </p:set>
+                                  </p:childTnLst>
+                                </p:cTn>
+                              </p:par>
+                            </p:childTnLst>
+                          </p:cTn>
+                        </p:par>
+                      </p:childTnLst>
+                    </p:cTn>
+                  </p:par>
+                  <p:par>
+                    <p:cTn id="7" fill="hold">
+                      <p:stCondLst>
+                        <p:cond delay="indefinite"/>
+                      </p:stCondLst>
+                      <p:childTnLst>
+                        <p:par>
+                          <p:cTn id="8" fill="hold">
+                            <p:stCondLst>
+                              <p:cond delay="0"/>
+                            </p:stCondLst>
+                            <p:childTnLst>
+                              <p:par>
+                                <p:cTn id="9" presetID="1" presetClass="entr" presetSubtype="0" fill="hold" nodeType="clickEffect">
+                                  <p:stCondLst>
+                                    <p:cond delay="0"/>
+                                  </p:stCondLst>
+                                  <p:childTnLst>
+                                    <p:set>
+                                      <p:cBhvr>
+                                        <p:cTn id="10" dur="1" fill="hold">
+                                          <p:stCondLst>
+                                            <p:cond delay="0"/>
+                                          </p:stCondLst>
+                                        </p:cTn>
+                                        <p:tgtEl>
+                                          <p:spTgt spid="7"/>
+                                        </p:tgtEl>
+                                        <p:attrNameLst>
+                                          <p:attrName>style.visibility</p:attrName>
+                                        </p:attrNameLst>
+                                      </p:cBhvr>
+                                      <p:to>
+                                        <p:strVal val="visible"/>
+                                      </p:to>
+                                    </p:set>
+                                  </p:childTnLst>
+                                </p:cTn>
+                              </p:par>
+                            </p:childTnLst>
+                          </p:cTn>
+                        </p:par>
+                      </p:childTnLst>
+                    </p:cTn>
+                  </p:par>
+                  <p:par>
+                    <p:cTn id="11" fill="hold">
+                      <p:stCondLst>
+                        <p:cond delay="indefinite"/>
+                      </p:stCondLst>
+                      <p:childTnLst>
+                        <p:par>
+                          <p:cTn id="12" fill="hold">
+                            <p:stCondLst>
+                              <p:cond delay="0"/>
+                            </p:stCondLst>
+                            <p:childTnLst>
+                              <p:par>
+                                <p:cTn id="13" presetID="1" presetClass="entr" presetSubtype="0" fill="hold" nodeType="clickEffect">
+                                  <p:stCondLst>
+                                    <p:cond delay="0"/>
+                                  </p:stCondLst>
+                                  <p:childTnLst>
+                                    <p:set>
+                                      <p:cBhvr>
+                                        <p:cTn id="14" dur="1" fill="hold">
+                                          <p:stCondLst>
+                                            <p:cond delay="0"/>
+                                          </p:stCondLst>
+                                        </p:cTn>
+                                        <p:tgtEl>
+                                          <p:spTgt spid="11"/>
+                                        </p:tgtEl>
+                                        <p:attrNameLst>
+                                          <p:attrName>style.visibility</p:attrName>
+                                        </p:attrNameLst>
+                                      </p:cBhvr>
+                                      <p:to>
+                                        <p:strVal val="visible"/>
+                                      </p:to>
+                                    </p:set>
+                                  </p:childTnLst>
+                                </p:cTn>
+                              </p:par>
+                            </p:childTnLst>
+                          </p:cTn>
+                        </p:par>
+                      </p:childTnLst>
+                    </p:cTn>
+                  </p:par>
+                  <p:par>
+                    <p:cTn id="15" fill="hold">
+                      <p:stCondLst>
+                        <p:cond delay="indefinite"/>
+                      </p:stCondLst>
+                      <p:childTnLst>
+                        <p:par>
+                          <p:cTn id="16" fill="hold">
+                            <p:stCondLst>
+                              <p:cond delay="0"/>
+                            </p:stCondLst>
+                            <p:childTnLst>
+                              <p:par>
+                                <p:cTn id="17" presetID="1" presetClass="entr" presetSubtype="0" fill="hold" nodeType="clickEffect">
+                                  <p:stCondLst>
+                                    <p:cond delay="0"/>
+                                  </p:stCondLst>
+                                  <p:childTnLst>
+                                    <p:set>
+                                      <p:cBhvr>
+                                        <p:cTn id="18" dur="1" fill="hold">
+                                          <p:stCondLst>
+                                            <p:cond delay="0"/>
+                                          </p:stCondLst>
+                                        </p:cTn>
+                                        <p:tgtEl>
+                                          <p:spTgt spid="15"/>
+                                        </p:tgtEl>
+                                        <p:attrNameLst>
+                                          <p:attrName>style.visibility</p:attrName>
+                                        </p:attrNameLst>
+                                      </p:cBhvr>
+                                      <p:to>
+                                        <p:strVal val="visible"/>
+                                      </p:to>
+                                    </p:set>
+                                  </p:childTnLst>
+                                </p:cTn>
+                              </p:par>
+                            </p:childTnLst>
+                          </p:cTn>
+                        </p:par>
+                      </p:childTnLst>
+                    </p:cTn>
+                  </p:par>
+                  <p:par>
+                    <p:cTn id="19" fill="hold">
+                      <p:stCondLst>
+                        <p:cond delay="indefinite"/>
+                      </p:stCondLst>
+                      <p:childTnLst>
+                        <p:par>
+                          <p:cTn id="20" fill="hold">
+                            <p:stCondLst>
+                              <p:cond delay="0"/>
+                            </p:stCondLst>
+                            <p:childTnLst>
+                              <p:par>
+                                <p:cTn id="21" presetID="1" presetClass="entr" presetSubtype="0" fill="hold" nodeType="clickEffect">
+                                  <p:stCondLst>
+                                    <p:cond delay="0"/>
+                                  </p:stCondLst>
+                                  <p:childTnLst>
+                                    <p:set>
+                                      <p:cBhvr>
+                                        <p:cTn id="22" dur="1" fill="hold">
+                                          <p:stCondLst>
+                                            <p:cond delay="0"/>
+                                          </p:stCondLst>
+                                        </p:cTn>
+                                        <p:tgtEl>
+                                          <p:spTgt spid="16"/>
+                                        </p:tgtEl>
+                                        <p:attrNameLst>
+                                          <p:attrName>style.visibility</p:attrName>
+                                        </p:attrNameLst>
+                                      </p:cBhvr>
+                                      <p:to>
+                                        <p:strVal val="visible"/>
+                                      </p:to>
+                                    </p:set>
+                                  </p:childTnLst>
+                                </p:cTn>
+                              </p:par>
+                            </p:childTnLst>
+                          </p:cTn>
+                        </p:par>
+                      </p:childTnLst>
+                    </p:cTn>
+                  </p:par>
+                </p:childTnLst>
+              </p:cTn>
+              <p:prevCondLst>
+                <p:cond evt="onPrev" delay="0">
+                  <p:tgtEl>
+                    <p:sldTgt/>
+                  </p:tgtEl>
+                </p:cond>
+              </p:prevCondLst>
+              <p:nextCondLst>
+                <p:cond evt="onNext" delay="0">
+                  <p:tgtEl>
+                    <p:sldTgt/>
+                  </p:tgtEl>
+                </p:cond>
+              </p:nextCondLst>
+            </p:seq>
+          </p:childTnLst>
+        </p:cTn>
+      </p:par>
+    </p:tnLst>
+  </p:timing>
 </p:sld>
 </file>
 

</xml_diff>